<commit_message>
Update Genetics Capitalism picture and add abstract and Github link
</commit_message>
<xml_diff>
--- a/research/img/research_headers.pptx
+++ b/research/img/research_headers.pptx
@@ -3,10 +3,12 @@
 <p:presentation xmlns:a="http://schemas.openxmlformats.org/drawingml/2006/main" xmlns:r="http://schemas.openxmlformats.org/officeDocument/2006/relationships" xmlns:p="http://schemas.openxmlformats.org/presentationml/2006/main" saveSubsetFonts="1">
   <p:sldMasterIdLst>
     <p:sldMasterId id="2147483684" r:id="rId1"/>
+    <p:sldMasterId id="2147483696" r:id="rId2"/>
   </p:sldMasterIdLst>
   <p:sldIdLst>
-    <p:sldId id="256" r:id="rId2"/>
-    <p:sldId id="257" r:id="rId3"/>
+    <p:sldId id="256" r:id="rId3"/>
+    <p:sldId id="257" r:id="rId4"/>
+    <p:sldId id="259" r:id="rId5"/>
   </p:sldIdLst>
   <p:sldSz cx="7315200" cy="5486400" type="B5JIS"/>
   <p:notesSz cx="6858000" cy="9144000"/>
@@ -244,7 +246,7 @@
           <a:p>
             <a:fld id="{DF9B7973-EE54-40B6-814D-4B97DB32E5B3}" type="datetimeFigureOut">
               <a:rPr lang="en-US" smtClean="0"/>
-              <a:t>10/1/2019</a:t>
+              <a:t>1/14/2020</a:t>
             </a:fld>
             <a:endParaRPr lang="en-US"/>
           </a:p>
@@ -414,7 +416,7 @@
           <a:p>
             <a:fld id="{DF9B7973-EE54-40B6-814D-4B97DB32E5B3}" type="datetimeFigureOut">
               <a:rPr lang="en-US" smtClean="0"/>
-              <a:t>10/1/2019</a:t>
+              <a:t>1/14/2020</a:t>
             </a:fld>
             <a:endParaRPr lang="en-US"/>
           </a:p>
@@ -594,7 +596,7 @@
           <a:p>
             <a:fld id="{DF9B7973-EE54-40B6-814D-4B97DB32E5B3}" type="datetimeFigureOut">
               <a:rPr lang="en-US" smtClean="0"/>
-              <a:t>10/1/2019</a:t>
+              <a:t>1/14/2020</a:t>
             </a:fld>
             <a:endParaRPr lang="en-US"/>
           </a:p>
@@ -646,6 +648,1941 @@
     <p:extLst>
       <p:ext uri="{BB962C8B-B14F-4D97-AF65-F5344CB8AC3E}">
         <p14:creationId xmlns:p14="http://schemas.microsoft.com/office/powerpoint/2010/main" val="3487233906"/>
+      </p:ext>
+    </p:extLst>
+  </p:cSld>
+  <p:clrMapOvr>
+    <a:masterClrMapping/>
+  </p:clrMapOvr>
+</p:sldLayout>
+</file>
+
+<file path=ppt/slideLayouts/slideLayout12.xml><?xml version="1.0" encoding="utf-8"?>
+<p:sldLayout xmlns:a="http://schemas.openxmlformats.org/drawingml/2006/main" xmlns:r="http://schemas.openxmlformats.org/officeDocument/2006/relationships" xmlns:p="http://schemas.openxmlformats.org/presentationml/2006/main" type="title" preserve="1">
+  <p:cSld name="Title Slide">
+    <p:spTree>
+      <p:nvGrpSpPr>
+        <p:cNvPr id="1" name=""/>
+        <p:cNvGrpSpPr/>
+        <p:nvPr/>
+      </p:nvGrpSpPr>
+      <p:grpSpPr>
+        <a:xfrm>
+          <a:off x="0" y="0"/>
+          <a:ext cx="0" cy="0"/>
+          <a:chOff x="0" y="0"/>
+          <a:chExt cx="0" cy="0"/>
+        </a:xfrm>
+      </p:grpSpPr>
+      <p:sp>
+        <p:nvSpPr>
+          <p:cNvPr id="2" name="Title 1">
+            <a:extLst>
+              <a:ext uri="{FF2B5EF4-FFF2-40B4-BE49-F238E27FC236}">
+                <a16:creationId xmlns:a16="http://schemas.microsoft.com/office/drawing/2014/main" id="{71499E6A-9984-4F20-A042-0ED078D52320}"/>
+              </a:ext>
+            </a:extLst>
+          </p:cNvPr>
+          <p:cNvSpPr>
+            <a:spLocks noGrp="1"/>
+          </p:cNvSpPr>
+          <p:nvPr>
+            <p:ph type="ctrTitle"/>
+          </p:nvPr>
+        </p:nvSpPr>
+        <p:spPr>
+          <a:xfrm>
+            <a:off x="914400" y="897890"/>
+            <a:ext cx="5486400" cy="1910080"/>
+          </a:xfrm>
+        </p:spPr>
+        <p:txBody>
+          <a:bodyPr anchor="b"/>
+          <a:lstStyle>
+            <a:lvl1pPr algn="ctr">
+              <a:defRPr sz="3600"/>
+            </a:lvl1pPr>
+          </a:lstStyle>
+          <a:p>
+            <a:r>
+              <a:rPr lang="en-US"/>
+              <a:t>Click to edit Master title style</a:t>
+            </a:r>
+          </a:p>
+        </p:txBody>
+      </p:sp>
+      <p:sp>
+        <p:nvSpPr>
+          <p:cNvPr id="3" name="Subtitle 2">
+            <a:extLst>
+              <a:ext uri="{FF2B5EF4-FFF2-40B4-BE49-F238E27FC236}">
+                <a16:creationId xmlns:a16="http://schemas.microsoft.com/office/drawing/2014/main" id="{7A0BF363-B9A0-4B5C-BA32-3B954F760924}"/>
+              </a:ext>
+            </a:extLst>
+          </p:cNvPr>
+          <p:cNvSpPr>
+            <a:spLocks noGrp="1"/>
+          </p:cNvSpPr>
+          <p:nvPr>
+            <p:ph type="subTitle" idx="1"/>
+          </p:nvPr>
+        </p:nvSpPr>
+        <p:spPr>
+          <a:xfrm>
+            <a:off x="914400" y="2881630"/>
+            <a:ext cx="5486400" cy="1324610"/>
+          </a:xfrm>
+        </p:spPr>
+        <p:txBody>
+          <a:bodyPr/>
+          <a:lstStyle>
+            <a:lvl1pPr marL="0" indent="0" algn="ctr">
+              <a:buNone/>
+              <a:defRPr sz="1440"/>
+            </a:lvl1pPr>
+            <a:lvl2pPr marL="274320" indent="0" algn="ctr">
+              <a:buNone/>
+              <a:defRPr sz="1200"/>
+            </a:lvl2pPr>
+            <a:lvl3pPr marL="548640" indent="0" algn="ctr">
+              <a:buNone/>
+              <a:defRPr sz="1080"/>
+            </a:lvl3pPr>
+            <a:lvl4pPr marL="822960" indent="0" algn="ctr">
+              <a:buNone/>
+              <a:defRPr sz="960"/>
+            </a:lvl4pPr>
+            <a:lvl5pPr marL="1097280" indent="0" algn="ctr">
+              <a:buNone/>
+              <a:defRPr sz="960"/>
+            </a:lvl5pPr>
+            <a:lvl6pPr marL="1371600" indent="0" algn="ctr">
+              <a:buNone/>
+              <a:defRPr sz="960"/>
+            </a:lvl6pPr>
+            <a:lvl7pPr marL="1645920" indent="0" algn="ctr">
+              <a:buNone/>
+              <a:defRPr sz="960"/>
+            </a:lvl7pPr>
+            <a:lvl8pPr marL="1920240" indent="0" algn="ctr">
+              <a:buNone/>
+              <a:defRPr sz="960"/>
+            </a:lvl8pPr>
+            <a:lvl9pPr marL="2194560" indent="0" algn="ctr">
+              <a:buNone/>
+              <a:defRPr sz="960"/>
+            </a:lvl9pPr>
+          </a:lstStyle>
+          <a:p>
+            <a:r>
+              <a:rPr lang="en-US"/>
+              <a:t>Click to edit Master subtitle style</a:t>
+            </a:r>
+          </a:p>
+        </p:txBody>
+      </p:sp>
+      <p:sp>
+        <p:nvSpPr>
+          <p:cNvPr id="4" name="Date Placeholder 3">
+            <a:extLst>
+              <a:ext uri="{FF2B5EF4-FFF2-40B4-BE49-F238E27FC236}">
+                <a16:creationId xmlns:a16="http://schemas.microsoft.com/office/drawing/2014/main" id="{E6B277D3-AD75-4E73-8DF1-F5C6CAAD8F1D}"/>
+              </a:ext>
+            </a:extLst>
+          </p:cNvPr>
+          <p:cNvSpPr>
+            <a:spLocks noGrp="1"/>
+          </p:cNvSpPr>
+          <p:nvPr>
+            <p:ph type="dt" sz="half" idx="10"/>
+          </p:nvPr>
+        </p:nvSpPr>
+        <p:spPr/>
+        <p:txBody>
+          <a:bodyPr/>
+          <a:lstStyle/>
+          <a:p>
+            <a:fld id="{D793FBF9-7FD6-43C2-8557-8F5C9FBE75EA}" type="datetimeFigureOut">
+              <a:rPr lang="en-US" smtClean="0"/>
+              <a:t>1/14/2020</a:t>
+            </a:fld>
+            <a:endParaRPr lang="en-US"/>
+          </a:p>
+        </p:txBody>
+      </p:sp>
+      <p:sp>
+        <p:nvSpPr>
+          <p:cNvPr id="5" name="Footer Placeholder 4">
+            <a:extLst>
+              <a:ext uri="{FF2B5EF4-FFF2-40B4-BE49-F238E27FC236}">
+                <a16:creationId xmlns:a16="http://schemas.microsoft.com/office/drawing/2014/main" id="{E102AEBF-CCD0-4A95-AC68-9245396D9153}"/>
+              </a:ext>
+            </a:extLst>
+          </p:cNvPr>
+          <p:cNvSpPr>
+            <a:spLocks noGrp="1"/>
+          </p:cNvSpPr>
+          <p:nvPr>
+            <p:ph type="ftr" sz="quarter" idx="11"/>
+          </p:nvPr>
+        </p:nvSpPr>
+        <p:spPr/>
+        <p:txBody>
+          <a:bodyPr/>
+          <a:lstStyle/>
+          <a:p>
+            <a:endParaRPr lang="en-US"/>
+          </a:p>
+        </p:txBody>
+      </p:sp>
+      <p:sp>
+        <p:nvSpPr>
+          <p:cNvPr id="6" name="Slide Number Placeholder 5">
+            <a:extLst>
+              <a:ext uri="{FF2B5EF4-FFF2-40B4-BE49-F238E27FC236}">
+                <a16:creationId xmlns:a16="http://schemas.microsoft.com/office/drawing/2014/main" id="{C913FAAC-9140-4D69-9C84-656BCC1D70DD}"/>
+              </a:ext>
+            </a:extLst>
+          </p:cNvPr>
+          <p:cNvSpPr>
+            <a:spLocks noGrp="1"/>
+          </p:cNvSpPr>
+          <p:nvPr>
+            <p:ph type="sldNum" sz="quarter" idx="12"/>
+          </p:nvPr>
+        </p:nvSpPr>
+        <p:spPr/>
+        <p:txBody>
+          <a:bodyPr/>
+          <a:lstStyle/>
+          <a:p>
+            <a:fld id="{36576177-7166-48FA-905C-416F917473F2}" type="slidenum">
+              <a:rPr lang="en-US" smtClean="0"/>
+              <a:t>‹#›</a:t>
+            </a:fld>
+            <a:endParaRPr lang="en-US"/>
+          </a:p>
+        </p:txBody>
+      </p:sp>
+    </p:spTree>
+    <p:extLst>
+      <p:ext uri="{BB962C8B-B14F-4D97-AF65-F5344CB8AC3E}">
+        <p14:creationId xmlns:p14="http://schemas.microsoft.com/office/powerpoint/2010/main" val="90266621"/>
+      </p:ext>
+    </p:extLst>
+  </p:cSld>
+  <p:clrMapOvr>
+    <a:masterClrMapping/>
+  </p:clrMapOvr>
+</p:sldLayout>
+</file>
+
+<file path=ppt/slideLayouts/slideLayout13.xml><?xml version="1.0" encoding="utf-8"?>
+<p:sldLayout xmlns:a="http://schemas.openxmlformats.org/drawingml/2006/main" xmlns:r="http://schemas.openxmlformats.org/officeDocument/2006/relationships" xmlns:p="http://schemas.openxmlformats.org/presentationml/2006/main" type="obj" preserve="1">
+  <p:cSld name="Title and Content">
+    <p:spTree>
+      <p:nvGrpSpPr>
+        <p:cNvPr id="1" name=""/>
+        <p:cNvGrpSpPr/>
+        <p:nvPr/>
+      </p:nvGrpSpPr>
+      <p:grpSpPr>
+        <a:xfrm>
+          <a:off x="0" y="0"/>
+          <a:ext cx="0" cy="0"/>
+          <a:chOff x="0" y="0"/>
+          <a:chExt cx="0" cy="0"/>
+        </a:xfrm>
+      </p:grpSpPr>
+      <p:sp>
+        <p:nvSpPr>
+          <p:cNvPr id="2" name="Title 1">
+            <a:extLst>
+              <a:ext uri="{FF2B5EF4-FFF2-40B4-BE49-F238E27FC236}">
+                <a16:creationId xmlns:a16="http://schemas.microsoft.com/office/drawing/2014/main" id="{740D93F7-ED86-43D2-A02D-C4AC8795F710}"/>
+              </a:ext>
+            </a:extLst>
+          </p:cNvPr>
+          <p:cNvSpPr>
+            <a:spLocks noGrp="1"/>
+          </p:cNvSpPr>
+          <p:nvPr>
+            <p:ph type="title"/>
+          </p:nvPr>
+        </p:nvSpPr>
+        <p:spPr/>
+        <p:txBody>
+          <a:bodyPr/>
+          <a:lstStyle/>
+          <a:p>
+            <a:r>
+              <a:rPr lang="en-US"/>
+              <a:t>Click to edit Master title style</a:t>
+            </a:r>
+          </a:p>
+        </p:txBody>
+      </p:sp>
+      <p:sp>
+        <p:nvSpPr>
+          <p:cNvPr id="3" name="Content Placeholder 2">
+            <a:extLst>
+              <a:ext uri="{FF2B5EF4-FFF2-40B4-BE49-F238E27FC236}">
+                <a16:creationId xmlns:a16="http://schemas.microsoft.com/office/drawing/2014/main" id="{40EE2633-B8A3-4843-AEE8-721DCC5464E1}"/>
+              </a:ext>
+            </a:extLst>
+          </p:cNvPr>
+          <p:cNvSpPr>
+            <a:spLocks noGrp="1"/>
+          </p:cNvSpPr>
+          <p:nvPr>
+            <p:ph idx="1"/>
+          </p:nvPr>
+        </p:nvSpPr>
+        <p:spPr/>
+        <p:txBody>
+          <a:bodyPr/>
+          <a:lstStyle/>
+          <a:p>
+            <a:pPr lvl="0"/>
+            <a:r>
+              <a:rPr lang="en-US"/>
+              <a:t>Click to edit Master text styles</a:t>
+            </a:r>
+          </a:p>
+          <a:p>
+            <a:pPr lvl="1"/>
+            <a:r>
+              <a:rPr lang="en-US"/>
+              <a:t>Second level</a:t>
+            </a:r>
+          </a:p>
+          <a:p>
+            <a:pPr lvl="2"/>
+            <a:r>
+              <a:rPr lang="en-US"/>
+              <a:t>Third level</a:t>
+            </a:r>
+          </a:p>
+          <a:p>
+            <a:pPr lvl="3"/>
+            <a:r>
+              <a:rPr lang="en-US"/>
+              <a:t>Fourth level</a:t>
+            </a:r>
+          </a:p>
+          <a:p>
+            <a:pPr lvl="4"/>
+            <a:r>
+              <a:rPr lang="en-US"/>
+              <a:t>Fifth level</a:t>
+            </a:r>
+          </a:p>
+        </p:txBody>
+      </p:sp>
+      <p:sp>
+        <p:nvSpPr>
+          <p:cNvPr id="4" name="Date Placeholder 3">
+            <a:extLst>
+              <a:ext uri="{FF2B5EF4-FFF2-40B4-BE49-F238E27FC236}">
+                <a16:creationId xmlns:a16="http://schemas.microsoft.com/office/drawing/2014/main" id="{C36DF892-036B-45A1-84A1-2A0858F07AFF}"/>
+              </a:ext>
+            </a:extLst>
+          </p:cNvPr>
+          <p:cNvSpPr>
+            <a:spLocks noGrp="1"/>
+          </p:cNvSpPr>
+          <p:nvPr>
+            <p:ph type="dt" sz="half" idx="10"/>
+          </p:nvPr>
+        </p:nvSpPr>
+        <p:spPr/>
+        <p:txBody>
+          <a:bodyPr/>
+          <a:lstStyle/>
+          <a:p>
+            <a:fld id="{D793FBF9-7FD6-43C2-8557-8F5C9FBE75EA}" type="datetimeFigureOut">
+              <a:rPr lang="en-US" smtClean="0"/>
+              <a:t>1/14/2020</a:t>
+            </a:fld>
+            <a:endParaRPr lang="en-US"/>
+          </a:p>
+        </p:txBody>
+      </p:sp>
+      <p:sp>
+        <p:nvSpPr>
+          <p:cNvPr id="5" name="Footer Placeholder 4">
+            <a:extLst>
+              <a:ext uri="{FF2B5EF4-FFF2-40B4-BE49-F238E27FC236}">
+                <a16:creationId xmlns:a16="http://schemas.microsoft.com/office/drawing/2014/main" id="{6A73BF26-B8AC-4C9B-BBD6-A5E9257C0CBE}"/>
+              </a:ext>
+            </a:extLst>
+          </p:cNvPr>
+          <p:cNvSpPr>
+            <a:spLocks noGrp="1"/>
+          </p:cNvSpPr>
+          <p:nvPr>
+            <p:ph type="ftr" sz="quarter" idx="11"/>
+          </p:nvPr>
+        </p:nvSpPr>
+        <p:spPr/>
+        <p:txBody>
+          <a:bodyPr/>
+          <a:lstStyle/>
+          <a:p>
+            <a:endParaRPr lang="en-US"/>
+          </a:p>
+        </p:txBody>
+      </p:sp>
+      <p:sp>
+        <p:nvSpPr>
+          <p:cNvPr id="6" name="Slide Number Placeholder 5">
+            <a:extLst>
+              <a:ext uri="{FF2B5EF4-FFF2-40B4-BE49-F238E27FC236}">
+                <a16:creationId xmlns:a16="http://schemas.microsoft.com/office/drawing/2014/main" id="{D7DCB22C-7FB8-4418-9BB3-A0F3CD7992FF}"/>
+              </a:ext>
+            </a:extLst>
+          </p:cNvPr>
+          <p:cNvSpPr>
+            <a:spLocks noGrp="1"/>
+          </p:cNvSpPr>
+          <p:nvPr>
+            <p:ph type="sldNum" sz="quarter" idx="12"/>
+          </p:nvPr>
+        </p:nvSpPr>
+        <p:spPr/>
+        <p:txBody>
+          <a:bodyPr/>
+          <a:lstStyle/>
+          <a:p>
+            <a:fld id="{36576177-7166-48FA-905C-416F917473F2}" type="slidenum">
+              <a:rPr lang="en-US" smtClean="0"/>
+              <a:t>‹#›</a:t>
+            </a:fld>
+            <a:endParaRPr lang="en-US"/>
+          </a:p>
+        </p:txBody>
+      </p:sp>
+    </p:spTree>
+    <p:extLst>
+      <p:ext uri="{BB962C8B-B14F-4D97-AF65-F5344CB8AC3E}">
+        <p14:creationId xmlns:p14="http://schemas.microsoft.com/office/powerpoint/2010/main" val="529686003"/>
+      </p:ext>
+    </p:extLst>
+  </p:cSld>
+  <p:clrMapOvr>
+    <a:masterClrMapping/>
+  </p:clrMapOvr>
+</p:sldLayout>
+</file>
+
+<file path=ppt/slideLayouts/slideLayout14.xml><?xml version="1.0" encoding="utf-8"?>
+<p:sldLayout xmlns:a="http://schemas.openxmlformats.org/drawingml/2006/main" xmlns:r="http://schemas.openxmlformats.org/officeDocument/2006/relationships" xmlns:p="http://schemas.openxmlformats.org/presentationml/2006/main" type="secHead" preserve="1">
+  <p:cSld name="Section Header">
+    <p:spTree>
+      <p:nvGrpSpPr>
+        <p:cNvPr id="1" name=""/>
+        <p:cNvGrpSpPr/>
+        <p:nvPr/>
+      </p:nvGrpSpPr>
+      <p:grpSpPr>
+        <a:xfrm>
+          <a:off x="0" y="0"/>
+          <a:ext cx="0" cy="0"/>
+          <a:chOff x="0" y="0"/>
+          <a:chExt cx="0" cy="0"/>
+        </a:xfrm>
+      </p:grpSpPr>
+      <p:sp>
+        <p:nvSpPr>
+          <p:cNvPr id="2" name="Title 1">
+            <a:extLst>
+              <a:ext uri="{FF2B5EF4-FFF2-40B4-BE49-F238E27FC236}">
+                <a16:creationId xmlns:a16="http://schemas.microsoft.com/office/drawing/2014/main" id="{59ADBAB2-10FA-40F1-BCBD-A96A42770955}"/>
+              </a:ext>
+            </a:extLst>
+          </p:cNvPr>
+          <p:cNvSpPr>
+            <a:spLocks noGrp="1"/>
+          </p:cNvSpPr>
+          <p:nvPr>
+            <p:ph type="title"/>
+          </p:nvPr>
+        </p:nvSpPr>
+        <p:spPr>
+          <a:xfrm>
+            <a:off x="499110" y="1367791"/>
+            <a:ext cx="6309360" cy="2282190"/>
+          </a:xfrm>
+        </p:spPr>
+        <p:txBody>
+          <a:bodyPr anchor="b"/>
+          <a:lstStyle>
+            <a:lvl1pPr>
+              <a:defRPr sz="3600"/>
+            </a:lvl1pPr>
+          </a:lstStyle>
+          <a:p>
+            <a:r>
+              <a:rPr lang="en-US"/>
+              <a:t>Click to edit Master title style</a:t>
+            </a:r>
+          </a:p>
+        </p:txBody>
+      </p:sp>
+      <p:sp>
+        <p:nvSpPr>
+          <p:cNvPr id="3" name="Text Placeholder 2">
+            <a:extLst>
+              <a:ext uri="{FF2B5EF4-FFF2-40B4-BE49-F238E27FC236}">
+                <a16:creationId xmlns:a16="http://schemas.microsoft.com/office/drawing/2014/main" id="{F7006C23-9A7E-41F5-BF9F-06CB35F800CE}"/>
+              </a:ext>
+            </a:extLst>
+          </p:cNvPr>
+          <p:cNvSpPr>
+            <a:spLocks noGrp="1"/>
+          </p:cNvSpPr>
+          <p:nvPr>
+            <p:ph type="body" idx="1"/>
+          </p:nvPr>
+        </p:nvSpPr>
+        <p:spPr>
+          <a:xfrm>
+            <a:off x="499110" y="3671571"/>
+            <a:ext cx="6309360" cy="1200150"/>
+          </a:xfrm>
+        </p:spPr>
+        <p:txBody>
+          <a:bodyPr/>
+          <a:lstStyle>
+            <a:lvl1pPr marL="0" indent="0">
+              <a:buNone/>
+              <a:defRPr sz="1440">
+                <a:solidFill>
+                  <a:schemeClr val="tx1">
+                    <a:tint val="75000"/>
+                  </a:schemeClr>
+                </a:solidFill>
+              </a:defRPr>
+            </a:lvl1pPr>
+            <a:lvl2pPr marL="274320" indent="0">
+              <a:buNone/>
+              <a:defRPr sz="1200">
+                <a:solidFill>
+                  <a:schemeClr val="tx1">
+                    <a:tint val="75000"/>
+                  </a:schemeClr>
+                </a:solidFill>
+              </a:defRPr>
+            </a:lvl2pPr>
+            <a:lvl3pPr marL="548640" indent="0">
+              <a:buNone/>
+              <a:defRPr sz="1080">
+                <a:solidFill>
+                  <a:schemeClr val="tx1">
+                    <a:tint val="75000"/>
+                  </a:schemeClr>
+                </a:solidFill>
+              </a:defRPr>
+            </a:lvl3pPr>
+            <a:lvl4pPr marL="822960" indent="0">
+              <a:buNone/>
+              <a:defRPr sz="960">
+                <a:solidFill>
+                  <a:schemeClr val="tx1">
+                    <a:tint val="75000"/>
+                  </a:schemeClr>
+                </a:solidFill>
+              </a:defRPr>
+            </a:lvl4pPr>
+            <a:lvl5pPr marL="1097280" indent="0">
+              <a:buNone/>
+              <a:defRPr sz="960">
+                <a:solidFill>
+                  <a:schemeClr val="tx1">
+                    <a:tint val="75000"/>
+                  </a:schemeClr>
+                </a:solidFill>
+              </a:defRPr>
+            </a:lvl5pPr>
+            <a:lvl6pPr marL="1371600" indent="0">
+              <a:buNone/>
+              <a:defRPr sz="960">
+                <a:solidFill>
+                  <a:schemeClr val="tx1">
+                    <a:tint val="75000"/>
+                  </a:schemeClr>
+                </a:solidFill>
+              </a:defRPr>
+            </a:lvl6pPr>
+            <a:lvl7pPr marL="1645920" indent="0">
+              <a:buNone/>
+              <a:defRPr sz="960">
+                <a:solidFill>
+                  <a:schemeClr val="tx1">
+                    <a:tint val="75000"/>
+                  </a:schemeClr>
+                </a:solidFill>
+              </a:defRPr>
+            </a:lvl7pPr>
+            <a:lvl8pPr marL="1920240" indent="0">
+              <a:buNone/>
+              <a:defRPr sz="960">
+                <a:solidFill>
+                  <a:schemeClr val="tx1">
+                    <a:tint val="75000"/>
+                  </a:schemeClr>
+                </a:solidFill>
+              </a:defRPr>
+            </a:lvl8pPr>
+            <a:lvl9pPr marL="2194560" indent="0">
+              <a:buNone/>
+              <a:defRPr sz="960">
+                <a:solidFill>
+                  <a:schemeClr val="tx1">
+                    <a:tint val="75000"/>
+                  </a:schemeClr>
+                </a:solidFill>
+              </a:defRPr>
+            </a:lvl9pPr>
+          </a:lstStyle>
+          <a:p>
+            <a:pPr lvl="0"/>
+            <a:r>
+              <a:rPr lang="en-US"/>
+              <a:t>Click to edit Master text styles</a:t>
+            </a:r>
+          </a:p>
+        </p:txBody>
+      </p:sp>
+      <p:sp>
+        <p:nvSpPr>
+          <p:cNvPr id="4" name="Date Placeholder 3">
+            <a:extLst>
+              <a:ext uri="{FF2B5EF4-FFF2-40B4-BE49-F238E27FC236}">
+                <a16:creationId xmlns:a16="http://schemas.microsoft.com/office/drawing/2014/main" id="{CD42D50B-9E12-4A33-A14A-A728773223D2}"/>
+              </a:ext>
+            </a:extLst>
+          </p:cNvPr>
+          <p:cNvSpPr>
+            <a:spLocks noGrp="1"/>
+          </p:cNvSpPr>
+          <p:nvPr>
+            <p:ph type="dt" sz="half" idx="10"/>
+          </p:nvPr>
+        </p:nvSpPr>
+        <p:spPr/>
+        <p:txBody>
+          <a:bodyPr/>
+          <a:lstStyle/>
+          <a:p>
+            <a:fld id="{D793FBF9-7FD6-43C2-8557-8F5C9FBE75EA}" type="datetimeFigureOut">
+              <a:rPr lang="en-US" smtClean="0"/>
+              <a:t>1/14/2020</a:t>
+            </a:fld>
+            <a:endParaRPr lang="en-US"/>
+          </a:p>
+        </p:txBody>
+      </p:sp>
+      <p:sp>
+        <p:nvSpPr>
+          <p:cNvPr id="5" name="Footer Placeholder 4">
+            <a:extLst>
+              <a:ext uri="{FF2B5EF4-FFF2-40B4-BE49-F238E27FC236}">
+                <a16:creationId xmlns:a16="http://schemas.microsoft.com/office/drawing/2014/main" id="{56C6C074-0FAB-4B23-BFAA-FF7AA0771EEC}"/>
+              </a:ext>
+            </a:extLst>
+          </p:cNvPr>
+          <p:cNvSpPr>
+            <a:spLocks noGrp="1"/>
+          </p:cNvSpPr>
+          <p:nvPr>
+            <p:ph type="ftr" sz="quarter" idx="11"/>
+          </p:nvPr>
+        </p:nvSpPr>
+        <p:spPr/>
+        <p:txBody>
+          <a:bodyPr/>
+          <a:lstStyle/>
+          <a:p>
+            <a:endParaRPr lang="en-US"/>
+          </a:p>
+        </p:txBody>
+      </p:sp>
+      <p:sp>
+        <p:nvSpPr>
+          <p:cNvPr id="6" name="Slide Number Placeholder 5">
+            <a:extLst>
+              <a:ext uri="{FF2B5EF4-FFF2-40B4-BE49-F238E27FC236}">
+                <a16:creationId xmlns:a16="http://schemas.microsoft.com/office/drawing/2014/main" id="{135DA0DA-BAA2-4C5C-B759-7819506A859F}"/>
+              </a:ext>
+            </a:extLst>
+          </p:cNvPr>
+          <p:cNvSpPr>
+            <a:spLocks noGrp="1"/>
+          </p:cNvSpPr>
+          <p:nvPr>
+            <p:ph type="sldNum" sz="quarter" idx="12"/>
+          </p:nvPr>
+        </p:nvSpPr>
+        <p:spPr/>
+        <p:txBody>
+          <a:bodyPr/>
+          <a:lstStyle/>
+          <a:p>
+            <a:fld id="{36576177-7166-48FA-905C-416F917473F2}" type="slidenum">
+              <a:rPr lang="en-US" smtClean="0"/>
+              <a:t>‹#›</a:t>
+            </a:fld>
+            <a:endParaRPr lang="en-US"/>
+          </a:p>
+        </p:txBody>
+      </p:sp>
+    </p:spTree>
+    <p:extLst>
+      <p:ext uri="{BB962C8B-B14F-4D97-AF65-F5344CB8AC3E}">
+        <p14:creationId xmlns:p14="http://schemas.microsoft.com/office/powerpoint/2010/main" val="4000941300"/>
+      </p:ext>
+    </p:extLst>
+  </p:cSld>
+  <p:clrMapOvr>
+    <a:masterClrMapping/>
+  </p:clrMapOvr>
+</p:sldLayout>
+</file>
+
+<file path=ppt/slideLayouts/slideLayout15.xml><?xml version="1.0" encoding="utf-8"?>
+<p:sldLayout xmlns:a="http://schemas.openxmlformats.org/drawingml/2006/main" xmlns:r="http://schemas.openxmlformats.org/officeDocument/2006/relationships" xmlns:p="http://schemas.openxmlformats.org/presentationml/2006/main" type="twoObj" preserve="1">
+  <p:cSld name="Two Content">
+    <p:spTree>
+      <p:nvGrpSpPr>
+        <p:cNvPr id="1" name=""/>
+        <p:cNvGrpSpPr/>
+        <p:nvPr/>
+      </p:nvGrpSpPr>
+      <p:grpSpPr>
+        <a:xfrm>
+          <a:off x="0" y="0"/>
+          <a:ext cx="0" cy="0"/>
+          <a:chOff x="0" y="0"/>
+          <a:chExt cx="0" cy="0"/>
+        </a:xfrm>
+      </p:grpSpPr>
+      <p:sp>
+        <p:nvSpPr>
+          <p:cNvPr id="2" name="Title 1">
+            <a:extLst>
+              <a:ext uri="{FF2B5EF4-FFF2-40B4-BE49-F238E27FC236}">
+                <a16:creationId xmlns:a16="http://schemas.microsoft.com/office/drawing/2014/main" id="{99B1270F-501C-403F-B7B0-F0E9382CB70C}"/>
+              </a:ext>
+            </a:extLst>
+          </p:cNvPr>
+          <p:cNvSpPr>
+            <a:spLocks noGrp="1"/>
+          </p:cNvSpPr>
+          <p:nvPr>
+            <p:ph type="title"/>
+          </p:nvPr>
+        </p:nvSpPr>
+        <p:spPr/>
+        <p:txBody>
+          <a:bodyPr/>
+          <a:lstStyle/>
+          <a:p>
+            <a:r>
+              <a:rPr lang="en-US"/>
+              <a:t>Click to edit Master title style</a:t>
+            </a:r>
+          </a:p>
+        </p:txBody>
+      </p:sp>
+      <p:sp>
+        <p:nvSpPr>
+          <p:cNvPr id="3" name="Content Placeholder 2">
+            <a:extLst>
+              <a:ext uri="{FF2B5EF4-FFF2-40B4-BE49-F238E27FC236}">
+                <a16:creationId xmlns:a16="http://schemas.microsoft.com/office/drawing/2014/main" id="{68AA26BA-B289-4E05-8234-7B5C86622238}"/>
+              </a:ext>
+            </a:extLst>
+          </p:cNvPr>
+          <p:cNvSpPr>
+            <a:spLocks noGrp="1"/>
+          </p:cNvSpPr>
+          <p:nvPr>
+            <p:ph sz="half" idx="1"/>
+          </p:nvPr>
+        </p:nvSpPr>
+        <p:spPr>
+          <a:xfrm>
+            <a:off x="502920" y="1460500"/>
+            <a:ext cx="3108960" cy="3481070"/>
+          </a:xfrm>
+        </p:spPr>
+        <p:txBody>
+          <a:bodyPr/>
+          <a:lstStyle/>
+          <a:p>
+            <a:pPr lvl="0"/>
+            <a:r>
+              <a:rPr lang="en-US"/>
+              <a:t>Click to edit Master text styles</a:t>
+            </a:r>
+          </a:p>
+          <a:p>
+            <a:pPr lvl="1"/>
+            <a:r>
+              <a:rPr lang="en-US"/>
+              <a:t>Second level</a:t>
+            </a:r>
+          </a:p>
+          <a:p>
+            <a:pPr lvl="2"/>
+            <a:r>
+              <a:rPr lang="en-US"/>
+              <a:t>Third level</a:t>
+            </a:r>
+          </a:p>
+          <a:p>
+            <a:pPr lvl="3"/>
+            <a:r>
+              <a:rPr lang="en-US"/>
+              <a:t>Fourth level</a:t>
+            </a:r>
+          </a:p>
+          <a:p>
+            <a:pPr lvl="4"/>
+            <a:r>
+              <a:rPr lang="en-US"/>
+              <a:t>Fifth level</a:t>
+            </a:r>
+          </a:p>
+        </p:txBody>
+      </p:sp>
+      <p:sp>
+        <p:nvSpPr>
+          <p:cNvPr id="4" name="Content Placeholder 3">
+            <a:extLst>
+              <a:ext uri="{FF2B5EF4-FFF2-40B4-BE49-F238E27FC236}">
+                <a16:creationId xmlns:a16="http://schemas.microsoft.com/office/drawing/2014/main" id="{DDB83259-523D-4F88-A5B1-7006EC81EEB3}"/>
+              </a:ext>
+            </a:extLst>
+          </p:cNvPr>
+          <p:cNvSpPr>
+            <a:spLocks noGrp="1"/>
+          </p:cNvSpPr>
+          <p:nvPr>
+            <p:ph sz="half" idx="2"/>
+          </p:nvPr>
+        </p:nvSpPr>
+        <p:spPr>
+          <a:xfrm>
+            <a:off x="3703320" y="1460500"/>
+            <a:ext cx="3108960" cy="3481070"/>
+          </a:xfrm>
+        </p:spPr>
+        <p:txBody>
+          <a:bodyPr/>
+          <a:lstStyle/>
+          <a:p>
+            <a:pPr lvl="0"/>
+            <a:r>
+              <a:rPr lang="en-US"/>
+              <a:t>Click to edit Master text styles</a:t>
+            </a:r>
+          </a:p>
+          <a:p>
+            <a:pPr lvl="1"/>
+            <a:r>
+              <a:rPr lang="en-US"/>
+              <a:t>Second level</a:t>
+            </a:r>
+          </a:p>
+          <a:p>
+            <a:pPr lvl="2"/>
+            <a:r>
+              <a:rPr lang="en-US"/>
+              <a:t>Third level</a:t>
+            </a:r>
+          </a:p>
+          <a:p>
+            <a:pPr lvl="3"/>
+            <a:r>
+              <a:rPr lang="en-US"/>
+              <a:t>Fourth level</a:t>
+            </a:r>
+          </a:p>
+          <a:p>
+            <a:pPr lvl="4"/>
+            <a:r>
+              <a:rPr lang="en-US"/>
+              <a:t>Fifth level</a:t>
+            </a:r>
+          </a:p>
+        </p:txBody>
+      </p:sp>
+      <p:sp>
+        <p:nvSpPr>
+          <p:cNvPr id="5" name="Date Placeholder 4">
+            <a:extLst>
+              <a:ext uri="{FF2B5EF4-FFF2-40B4-BE49-F238E27FC236}">
+                <a16:creationId xmlns:a16="http://schemas.microsoft.com/office/drawing/2014/main" id="{E4FB7156-A4BF-4D3A-857A-96A854C75937}"/>
+              </a:ext>
+            </a:extLst>
+          </p:cNvPr>
+          <p:cNvSpPr>
+            <a:spLocks noGrp="1"/>
+          </p:cNvSpPr>
+          <p:nvPr>
+            <p:ph type="dt" sz="half" idx="10"/>
+          </p:nvPr>
+        </p:nvSpPr>
+        <p:spPr/>
+        <p:txBody>
+          <a:bodyPr/>
+          <a:lstStyle/>
+          <a:p>
+            <a:fld id="{D793FBF9-7FD6-43C2-8557-8F5C9FBE75EA}" type="datetimeFigureOut">
+              <a:rPr lang="en-US" smtClean="0"/>
+              <a:t>1/14/2020</a:t>
+            </a:fld>
+            <a:endParaRPr lang="en-US"/>
+          </a:p>
+        </p:txBody>
+      </p:sp>
+      <p:sp>
+        <p:nvSpPr>
+          <p:cNvPr id="6" name="Footer Placeholder 5">
+            <a:extLst>
+              <a:ext uri="{FF2B5EF4-FFF2-40B4-BE49-F238E27FC236}">
+                <a16:creationId xmlns:a16="http://schemas.microsoft.com/office/drawing/2014/main" id="{ED69EEC0-70BD-409A-A968-4005A99FEFF6}"/>
+              </a:ext>
+            </a:extLst>
+          </p:cNvPr>
+          <p:cNvSpPr>
+            <a:spLocks noGrp="1"/>
+          </p:cNvSpPr>
+          <p:nvPr>
+            <p:ph type="ftr" sz="quarter" idx="11"/>
+          </p:nvPr>
+        </p:nvSpPr>
+        <p:spPr/>
+        <p:txBody>
+          <a:bodyPr/>
+          <a:lstStyle/>
+          <a:p>
+            <a:endParaRPr lang="en-US"/>
+          </a:p>
+        </p:txBody>
+      </p:sp>
+      <p:sp>
+        <p:nvSpPr>
+          <p:cNvPr id="7" name="Slide Number Placeholder 6">
+            <a:extLst>
+              <a:ext uri="{FF2B5EF4-FFF2-40B4-BE49-F238E27FC236}">
+                <a16:creationId xmlns:a16="http://schemas.microsoft.com/office/drawing/2014/main" id="{9B6E00BB-5476-4B34-9A94-ED204300EE4B}"/>
+              </a:ext>
+            </a:extLst>
+          </p:cNvPr>
+          <p:cNvSpPr>
+            <a:spLocks noGrp="1"/>
+          </p:cNvSpPr>
+          <p:nvPr>
+            <p:ph type="sldNum" sz="quarter" idx="12"/>
+          </p:nvPr>
+        </p:nvSpPr>
+        <p:spPr/>
+        <p:txBody>
+          <a:bodyPr/>
+          <a:lstStyle/>
+          <a:p>
+            <a:fld id="{36576177-7166-48FA-905C-416F917473F2}" type="slidenum">
+              <a:rPr lang="en-US" smtClean="0"/>
+              <a:t>‹#›</a:t>
+            </a:fld>
+            <a:endParaRPr lang="en-US"/>
+          </a:p>
+        </p:txBody>
+      </p:sp>
+    </p:spTree>
+    <p:extLst>
+      <p:ext uri="{BB962C8B-B14F-4D97-AF65-F5344CB8AC3E}">
+        <p14:creationId xmlns:p14="http://schemas.microsoft.com/office/powerpoint/2010/main" val="1381799030"/>
+      </p:ext>
+    </p:extLst>
+  </p:cSld>
+  <p:clrMapOvr>
+    <a:masterClrMapping/>
+  </p:clrMapOvr>
+</p:sldLayout>
+</file>
+
+<file path=ppt/slideLayouts/slideLayout16.xml><?xml version="1.0" encoding="utf-8"?>
+<p:sldLayout xmlns:a="http://schemas.openxmlformats.org/drawingml/2006/main" xmlns:r="http://schemas.openxmlformats.org/officeDocument/2006/relationships" xmlns:p="http://schemas.openxmlformats.org/presentationml/2006/main" type="twoTxTwoObj" preserve="1">
+  <p:cSld name="Comparison">
+    <p:spTree>
+      <p:nvGrpSpPr>
+        <p:cNvPr id="1" name=""/>
+        <p:cNvGrpSpPr/>
+        <p:nvPr/>
+      </p:nvGrpSpPr>
+      <p:grpSpPr>
+        <a:xfrm>
+          <a:off x="0" y="0"/>
+          <a:ext cx="0" cy="0"/>
+          <a:chOff x="0" y="0"/>
+          <a:chExt cx="0" cy="0"/>
+        </a:xfrm>
+      </p:grpSpPr>
+      <p:sp>
+        <p:nvSpPr>
+          <p:cNvPr id="2" name="Title 1">
+            <a:extLst>
+              <a:ext uri="{FF2B5EF4-FFF2-40B4-BE49-F238E27FC236}">
+                <a16:creationId xmlns:a16="http://schemas.microsoft.com/office/drawing/2014/main" id="{1A688C29-03F8-49C0-9896-5740C024120D}"/>
+              </a:ext>
+            </a:extLst>
+          </p:cNvPr>
+          <p:cNvSpPr>
+            <a:spLocks noGrp="1"/>
+          </p:cNvSpPr>
+          <p:nvPr>
+            <p:ph type="title"/>
+          </p:nvPr>
+        </p:nvSpPr>
+        <p:spPr>
+          <a:xfrm>
+            <a:off x="503873" y="292101"/>
+            <a:ext cx="6309360" cy="1060450"/>
+          </a:xfrm>
+        </p:spPr>
+        <p:txBody>
+          <a:bodyPr/>
+          <a:lstStyle/>
+          <a:p>
+            <a:r>
+              <a:rPr lang="en-US"/>
+              <a:t>Click to edit Master title style</a:t>
+            </a:r>
+          </a:p>
+        </p:txBody>
+      </p:sp>
+      <p:sp>
+        <p:nvSpPr>
+          <p:cNvPr id="3" name="Text Placeholder 2">
+            <a:extLst>
+              <a:ext uri="{FF2B5EF4-FFF2-40B4-BE49-F238E27FC236}">
+                <a16:creationId xmlns:a16="http://schemas.microsoft.com/office/drawing/2014/main" id="{49AF1FCE-D933-4D3E-A37E-3F544541489E}"/>
+              </a:ext>
+            </a:extLst>
+          </p:cNvPr>
+          <p:cNvSpPr>
+            <a:spLocks noGrp="1"/>
+          </p:cNvSpPr>
+          <p:nvPr>
+            <p:ph type="body" idx="1"/>
+          </p:nvPr>
+        </p:nvSpPr>
+        <p:spPr>
+          <a:xfrm>
+            <a:off x="503873" y="1344930"/>
+            <a:ext cx="3094672" cy="659130"/>
+          </a:xfrm>
+        </p:spPr>
+        <p:txBody>
+          <a:bodyPr anchor="b"/>
+          <a:lstStyle>
+            <a:lvl1pPr marL="0" indent="0">
+              <a:buNone/>
+              <a:defRPr sz="1440" b="1"/>
+            </a:lvl1pPr>
+            <a:lvl2pPr marL="274320" indent="0">
+              <a:buNone/>
+              <a:defRPr sz="1200" b="1"/>
+            </a:lvl2pPr>
+            <a:lvl3pPr marL="548640" indent="0">
+              <a:buNone/>
+              <a:defRPr sz="1080" b="1"/>
+            </a:lvl3pPr>
+            <a:lvl4pPr marL="822960" indent="0">
+              <a:buNone/>
+              <a:defRPr sz="960" b="1"/>
+            </a:lvl4pPr>
+            <a:lvl5pPr marL="1097280" indent="0">
+              <a:buNone/>
+              <a:defRPr sz="960" b="1"/>
+            </a:lvl5pPr>
+            <a:lvl6pPr marL="1371600" indent="0">
+              <a:buNone/>
+              <a:defRPr sz="960" b="1"/>
+            </a:lvl6pPr>
+            <a:lvl7pPr marL="1645920" indent="0">
+              <a:buNone/>
+              <a:defRPr sz="960" b="1"/>
+            </a:lvl7pPr>
+            <a:lvl8pPr marL="1920240" indent="0">
+              <a:buNone/>
+              <a:defRPr sz="960" b="1"/>
+            </a:lvl8pPr>
+            <a:lvl9pPr marL="2194560" indent="0">
+              <a:buNone/>
+              <a:defRPr sz="960" b="1"/>
+            </a:lvl9pPr>
+          </a:lstStyle>
+          <a:p>
+            <a:pPr lvl="0"/>
+            <a:r>
+              <a:rPr lang="en-US"/>
+              <a:t>Click to edit Master text styles</a:t>
+            </a:r>
+          </a:p>
+        </p:txBody>
+      </p:sp>
+      <p:sp>
+        <p:nvSpPr>
+          <p:cNvPr id="4" name="Content Placeholder 3">
+            <a:extLst>
+              <a:ext uri="{FF2B5EF4-FFF2-40B4-BE49-F238E27FC236}">
+                <a16:creationId xmlns:a16="http://schemas.microsoft.com/office/drawing/2014/main" id="{10E4113A-B94D-48BE-B690-06D89995DD19}"/>
+              </a:ext>
+            </a:extLst>
+          </p:cNvPr>
+          <p:cNvSpPr>
+            <a:spLocks noGrp="1"/>
+          </p:cNvSpPr>
+          <p:nvPr>
+            <p:ph sz="half" idx="2"/>
+          </p:nvPr>
+        </p:nvSpPr>
+        <p:spPr>
+          <a:xfrm>
+            <a:off x="503873" y="2004060"/>
+            <a:ext cx="3094672" cy="2947670"/>
+          </a:xfrm>
+        </p:spPr>
+        <p:txBody>
+          <a:bodyPr/>
+          <a:lstStyle/>
+          <a:p>
+            <a:pPr lvl="0"/>
+            <a:r>
+              <a:rPr lang="en-US"/>
+              <a:t>Click to edit Master text styles</a:t>
+            </a:r>
+          </a:p>
+          <a:p>
+            <a:pPr lvl="1"/>
+            <a:r>
+              <a:rPr lang="en-US"/>
+              <a:t>Second level</a:t>
+            </a:r>
+          </a:p>
+          <a:p>
+            <a:pPr lvl="2"/>
+            <a:r>
+              <a:rPr lang="en-US"/>
+              <a:t>Third level</a:t>
+            </a:r>
+          </a:p>
+          <a:p>
+            <a:pPr lvl="3"/>
+            <a:r>
+              <a:rPr lang="en-US"/>
+              <a:t>Fourth level</a:t>
+            </a:r>
+          </a:p>
+          <a:p>
+            <a:pPr lvl="4"/>
+            <a:r>
+              <a:rPr lang="en-US"/>
+              <a:t>Fifth level</a:t>
+            </a:r>
+          </a:p>
+        </p:txBody>
+      </p:sp>
+      <p:sp>
+        <p:nvSpPr>
+          <p:cNvPr id="5" name="Text Placeholder 4">
+            <a:extLst>
+              <a:ext uri="{FF2B5EF4-FFF2-40B4-BE49-F238E27FC236}">
+                <a16:creationId xmlns:a16="http://schemas.microsoft.com/office/drawing/2014/main" id="{0C74B218-4A08-4B99-AA3E-21932DAA6712}"/>
+              </a:ext>
+            </a:extLst>
+          </p:cNvPr>
+          <p:cNvSpPr>
+            <a:spLocks noGrp="1"/>
+          </p:cNvSpPr>
+          <p:nvPr>
+            <p:ph type="body" sz="quarter" idx="3"/>
+          </p:nvPr>
+        </p:nvSpPr>
+        <p:spPr>
+          <a:xfrm>
+            <a:off x="3703320" y="1344930"/>
+            <a:ext cx="3109913" cy="659130"/>
+          </a:xfrm>
+        </p:spPr>
+        <p:txBody>
+          <a:bodyPr anchor="b"/>
+          <a:lstStyle>
+            <a:lvl1pPr marL="0" indent="0">
+              <a:buNone/>
+              <a:defRPr sz="1440" b="1"/>
+            </a:lvl1pPr>
+            <a:lvl2pPr marL="274320" indent="0">
+              <a:buNone/>
+              <a:defRPr sz="1200" b="1"/>
+            </a:lvl2pPr>
+            <a:lvl3pPr marL="548640" indent="0">
+              <a:buNone/>
+              <a:defRPr sz="1080" b="1"/>
+            </a:lvl3pPr>
+            <a:lvl4pPr marL="822960" indent="0">
+              <a:buNone/>
+              <a:defRPr sz="960" b="1"/>
+            </a:lvl4pPr>
+            <a:lvl5pPr marL="1097280" indent="0">
+              <a:buNone/>
+              <a:defRPr sz="960" b="1"/>
+            </a:lvl5pPr>
+            <a:lvl6pPr marL="1371600" indent="0">
+              <a:buNone/>
+              <a:defRPr sz="960" b="1"/>
+            </a:lvl6pPr>
+            <a:lvl7pPr marL="1645920" indent="0">
+              <a:buNone/>
+              <a:defRPr sz="960" b="1"/>
+            </a:lvl7pPr>
+            <a:lvl8pPr marL="1920240" indent="0">
+              <a:buNone/>
+              <a:defRPr sz="960" b="1"/>
+            </a:lvl8pPr>
+            <a:lvl9pPr marL="2194560" indent="0">
+              <a:buNone/>
+              <a:defRPr sz="960" b="1"/>
+            </a:lvl9pPr>
+          </a:lstStyle>
+          <a:p>
+            <a:pPr lvl="0"/>
+            <a:r>
+              <a:rPr lang="en-US"/>
+              <a:t>Click to edit Master text styles</a:t>
+            </a:r>
+          </a:p>
+        </p:txBody>
+      </p:sp>
+      <p:sp>
+        <p:nvSpPr>
+          <p:cNvPr id="6" name="Content Placeholder 5">
+            <a:extLst>
+              <a:ext uri="{FF2B5EF4-FFF2-40B4-BE49-F238E27FC236}">
+                <a16:creationId xmlns:a16="http://schemas.microsoft.com/office/drawing/2014/main" id="{AA8F878B-D0E4-4D37-A62F-EBA593C09C15}"/>
+              </a:ext>
+            </a:extLst>
+          </p:cNvPr>
+          <p:cNvSpPr>
+            <a:spLocks noGrp="1"/>
+          </p:cNvSpPr>
+          <p:nvPr>
+            <p:ph sz="quarter" idx="4"/>
+          </p:nvPr>
+        </p:nvSpPr>
+        <p:spPr>
+          <a:xfrm>
+            <a:off x="3703320" y="2004060"/>
+            <a:ext cx="3109913" cy="2947670"/>
+          </a:xfrm>
+        </p:spPr>
+        <p:txBody>
+          <a:bodyPr/>
+          <a:lstStyle/>
+          <a:p>
+            <a:pPr lvl="0"/>
+            <a:r>
+              <a:rPr lang="en-US"/>
+              <a:t>Click to edit Master text styles</a:t>
+            </a:r>
+          </a:p>
+          <a:p>
+            <a:pPr lvl="1"/>
+            <a:r>
+              <a:rPr lang="en-US"/>
+              <a:t>Second level</a:t>
+            </a:r>
+          </a:p>
+          <a:p>
+            <a:pPr lvl="2"/>
+            <a:r>
+              <a:rPr lang="en-US"/>
+              <a:t>Third level</a:t>
+            </a:r>
+          </a:p>
+          <a:p>
+            <a:pPr lvl="3"/>
+            <a:r>
+              <a:rPr lang="en-US"/>
+              <a:t>Fourth level</a:t>
+            </a:r>
+          </a:p>
+          <a:p>
+            <a:pPr lvl="4"/>
+            <a:r>
+              <a:rPr lang="en-US"/>
+              <a:t>Fifth level</a:t>
+            </a:r>
+          </a:p>
+        </p:txBody>
+      </p:sp>
+      <p:sp>
+        <p:nvSpPr>
+          <p:cNvPr id="7" name="Date Placeholder 6">
+            <a:extLst>
+              <a:ext uri="{FF2B5EF4-FFF2-40B4-BE49-F238E27FC236}">
+                <a16:creationId xmlns:a16="http://schemas.microsoft.com/office/drawing/2014/main" id="{A1EBEB12-D430-414C-9A8D-F57DB891E23F}"/>
+              </a:ext>
+            </a:extLst>
+          </p:cNvPr>
+          <p:cNvSpPr>
+            <a:spLocks noGrp="1"/>
+          </p:cNvSpPr>
+          <p:nvPr>
+            <p:ph type="dt" sz="half" idx="10"/>
+          </p:nvPr>
+        </p:nvSpPr>
+        <p:spPr/>
+        <p:txBody>
+          <a:bodyPr/>
+          <a:lstStyle/>
+          <a:p>
+            <a:fld id="{D793FBF9-7FD6-43C2-8557-8F5C9FBE75EA}" type="datetimeFigureOut">
+              <a:rPr lang="en-US" smtClean="0"/>
+              <a:t>1/14/2020</a:t>
+            </a:fld>
+            <a:endParaRPr lang="en-US"/>
+          </a:p>
+        </p:txBody>
+      </p:sp>
+      <p:sp>
+        <p:nvSpPr>
+          <p:cNvPr id="8" name="Footer Placeholder 7">
+            <a:extLst>
+              <a:ext uri="{FF2B5EF4-FFF2-40B4-BE49-F238E27FC236}">
+                <a16:creationId xmlns:a16="http://schemas.microsoft.com/office/drawing/2014/main" id="{645CF778-BD24-41E5-BDEB-771CFB4E9C9B}"/>
+              </a:ext>
+            </a:extLst>
+          </p:cNvPr>
+          <p:cNvSpPr>
+            <a:spLocks noGrp="1"/>
+          </p:cNvSpPr>
+          <p:nvPr>
+            <p:ph type="ftr" sz="quarter" idx="11"/>
+          </p:nvPr>
+        </p:nvSpPr>
+        <p:spPr/>
+        <p:txBody>
+          <a:bodyPr/>
+          <a:lstStyle/>
+          <a:p>
+            <a:endParaRPr lang="en-US"/>
+          </a:p>
+        </p:txBody>
+      </p:sp>
+      <p:sp>
+        <p:nvSpPr>
+          <p:cNvPr id="9" name="Slide Number Placeholder 8">
+            <a:extLst>
+              <a:ext uri="{FF2B5EF4-FFF2-40B4-BE49-F238E27FC236}">
+                <a16:creationId xmlns:a16="http://schemas.microsoft.com/office/drawing/2014/main" id="{CDA21FDC-2873-4272-B1A3-151A7A1AD540}"/>
+              </a:ext>
+            </a:extLst>
+          </p:cNvPr>
+          <p:cNvSpPr>
+            <a:spLocks noGrp="1"/>
+          </p:cNvSpPr>
+          <p:nvPr>
+            <p:ph type="sldNum" sz="quarter" idx="12"/>
+          </p:nvPr>
+        </p:nvSpPr>
+        <p:spPr/>
+        <p:txBody>
+          <a:bodyPr/>
+          <a:lstStyle/>
+          <a:p>
+            <a:fld id="{36576177-7166-48FA-905C-416F917473F2}" type="slidenum">
+              <a:rPr lang="en-US" smtClean="0"/>
+              <a:t>‹#›</a:t>
+            </a:fld>
+            <a:endParaRPr lang="en-US"/>
+          </a:p>
+        </p:txBody>
+      </p:sp>
+    </p:spTree>
+    <p:extLst>
+      <p:ext uri="{BB962C8B-B14F-4D97-AF65-F5344CB8AC3E}">
+        <p14:creationId xmlns:p14="http://schemas.microsoft.com/office/powerpoint/2010/main" val="1061250166"/>
+      </p:ext>
+    </p:extLst>
+  </p:cSld>
+  <p:clrMapOvr>
+    <a:masterClrMapping/>
+  </p:clrMapOvr>
+</p:sldLayout>
+</file>
+
+<file path=ppt/slideLayouts/slideLayout17.xml><?xml version="1.0" encoding="utf-8"?>
+<p:sldLayout xmlns:a="http://schemas.openxmlformats.org/drawingml/2006/main" xmlns:r="http://schemas.openxmlformats.org/officeDocument/2006/relationships" xmlns:p="http://schemas.openxmlformats.org/presentationml/2006/main" type="titleOnly" preserve="1">
+  <p:cSld name="Title Only">
+    <p:spTree>
+      <p:nvGrpSpPr>
+        <p:cNvPr id="1" name=""/>
+        <p:cNvGrpSpPr/>
+        <p:nvPr/>
+      </p:nvGrpSpPr>
+      <p:grpSpPr>
+        <a:xfrm>
+          <a:off x="0" y="0"/>
+          <a:ext cx="0" cy="0"/>
+          <a:chOff x="0" y="0"/>
+          <a:chExt cx="0" cy="0"/>
+        </a:xfrm>
+      </p:grpSpPr>
+      <p:sp>
+        <p:nvSpPr>
+          <p:cNvPr id="2" name="Title 1">
+            <a:extLst>
+              <a:ext uri="{FF2B5EF4-FFF2-40B4-BE49-F238E27FC236}">
+                <a16:creationId xmlns:a16="http://schemas.microsoft.com/office/drawing/2014/main" id="{00B8E938-7885-4EE5-96E5-E34CA54B7888}"/>
+              </a:ext>
+            </a:extLst>
+          </p:cNvPr>
+          <p:cNvSpPr>
+            <a:spLocks noGrp="1"/>
+          </p:cNvSpPr>
+          <p:nvPr>
+            <p:ph type="title"/>
+          </p:nvPr>
+        </p:nvSpPr>
+        <p:spPr/>
+        <p:txBody>
+          <a:bodyPr/>
+          <a:lstStyle/>
+          <a:p>
+            <a:r>
+              <a:rPr lang="en-US"/>
+              <a:t>Click to edit Master title style</a:t>
+            </a:r>
+          </a:p>
+        </p:txBody>
+      </p:sp>
+      <p:sp>
+        <p:nvSpPr>
+          <p:cNvPr id="3" name="Date Placeholder 2">
+            <a:extLst>
+              <a:ext uri="{FF2B5EF4-FFF2-40B4-BE49-F238E27FC236}">
+                <a16:creationId xmlns:a16="http://schemas.microsoft.com/office/drawing/2014/main" id="{D6F31C11-0950-4FD1-AB35-8CEDA987091B}"/>
+              </a:ext>
+            </a:extLst>
+          </p:cNvPr>
+          <p:cNvSpPr>
+            <a:spLocks noGrp="1"/>
+          </p:cNvSpPr>
+          <p:nvPr>
+            <p:ph type="dt" sz="half" idx="10"/>
+          </p:nvPr>
+        </p:nvSpPr>
+        <p:spPr/>
+        <p:txBody>
+          <a:bodyPr/>
+          <a:lstStyle/>
+          <a:p>
+            <a:fld id="{D793FBF9-7FD6-43C2-8557-8F5C9FBE75EA}" type="datetimeFigureOut">
+              <a:rPr lang="en-US" smtClean="0"/>
+              <a:t>1/14/2020</a:t>
+            </a:fld>
+            <a:endParaRPr lang="en-US"/>
+          </a:p>
+        </p:txBody>
+      </p:sp>
+      <p:sp>
+        <p:nvSpPr>
+          <p:cNvPr id="4" name="Footer Placeholder 3">
+            <a:extLst>
+              <a:ext uri="{FF2B5EF4-FFF2-40B4-BE49-F238E27FC236}">
+                <a16:creationId xmlns:a16="http://schemas.microsoft.com/office/drawing/2014/main" id="{060F38C8-5B47-4523-80EC-4DBF95FA04FF}"/>
+              </a:ext>
+            </a:extLst>
+          </p:cNvPr>
+          <p:cNvSpPr>
+            <a:spLocks noGrp="1"/>
+          </p:cNvSpPr>
+          <p:nvPr>
+            <p:ph type="ftr" sz="quarter" idx="11"/>
+          </p:nvPr>
+        </p:nvSpPr>
+        <p:spPr/>
+        <p:txBody>
+          <a:bodyPr/>
+          <a:lstStyle/>
+          <a:p>
+            <a:endParaRPr lang="en-US"/>
+          </a:p>
+        </p:txBody>
+      </p:sp>
+      <p:sp>
+        <p:nvSpPr>
+          <p:cNvPr id="5" name="Slide Number Placeholder 4">
+            <a:extLst>
+              <a:ext uri="{FF2B5EF4-FFF2-40B4-BE49-F238E27FC236}">
+                <a16:creationId xmlns:a16="http://schemas.microsoft.com/office/drawing/2014/main" id="{A88DDC4E-7DD2-44A5-852B-5E2B78D7B9DE}"/>
+              </a:ext>
+            </a:extLst>
+          </p:cNvPr>
+          <p:cNvSpPr>
+            <a:spLocks noGrp="1"/>
+          </p:cNvSpPr>
+          <p:nvPr>
+            <p:ph type="sldNum" sz="quarter" idx="12"/>
+          </p:nvPr>
+        </p:nvSpPr>
+        <p:spPr/>
+        <p:txBody>
+          <a:bodyPr/>
+          <a:lstStyle/>
+          <a:p>
+            <a:fld id="{36576177-7166-48FA-905C-416F917473F2}" type="slidenum">
+              <a:rPr lang="en-US" smtClean="0"/>
+              <a:t>‹#›</a:t>
+            </a:fld>
+            <a:endParaRPr lang="en-US"/>
+          </a:p>
+        </p:txBody>
+      </p:sp>
+    </p:spTree>
+    <p:extLst>
+      <p:ext uri="{BB962C8B-B14F-4D97-AF65-F5344CB8AC3E}">
+        <p14:creationId xmlns:p14="http://schemas.microsoft.com/office/powerpoint/2010/main" val="228379835"/>
+      </p:ext>
+    </p:extLst>
+  </p:cSld>
+  <p:clrMapOvr>
+    <a:masterClrMapping/>
+  </p:clrMapOvr>
+</p:sldLayout>
+</file>
+
+<file path=ppt/slideLayouts/slideLayout18.xml><?xml version="1.0" encoding="utf-8"?>
+<p:sldLayout xmlns:a="http://schemas.openxmlformats.org/drawingml/2006/main" xmlns:r="http://schemas.openxmlformats.org/officeDocument/2006/relationships" xmlns:p="http://schemas.openxmlformats.org/presentationml/2006/main" type="blank" preserve="1">
+  <p:cSld name="Blank">
+    <p:spTree>
+      <p:nvGrpSpPr>
+        <p:cNvPr id="1" name=""/>
+        <p:cNvGrpSpPr/>
+        <p:nvPr/>
+      </p:nvGrpSpPr>
+      <p:grpSpPr>
+        <a:xfrm>
+          <a:off x="0" y="0"/>
+          <a:ext cx="0" cy="0"/>
+          <a:chOff x="0" y="0"/>
+          <a:chExt cx="0" cy="0"/>
+        </a:xfrm>
+      </p:grpSpPr>
+      <p:sp>
+        <p:nvSpPr>
+          <p:cNvPr id="2" name="Date Placeholder 1">
+            <a:extLst>
+              <a:ext uri="{FF2B5EF4-FFF2-40B4-BE49-F238E27FC236}">
+                <a16:creationId xmlns:a16="http://schemas.microsoft.com/office/drawing/2014/main" id="{CDF6FD9F-5DCA-452C-AD58-E45DB7C9F78C}"/>
+              </a:ext>
+            </a:extLst>
+          </p:cNvPr>
+          <p:cNvSpPr>
+            <a:spLocks noGrp="1"/>
+          </p:cNvSpPr>
+          <p:nvPr>
+            <p:ph type="dt" sz="half" idx="10"/>
+          </p:nvPr>
+        </p:nvSpPr>
+        <p:spPr/>
+        <p:txBody>
+          <a:bodyPr/>
+          <a:lstStyle/>
+          <a:p>
+            <a:fld id="{D793FBF9-7FD6-43C2-8557-8F5C9FBE75EA}" type="datetimeFigureOut">
+              <a:rPr lang="en-US" smtClean="0"/>
+              <a:t>1/14/2020</a:t>
+            </a:fld>
+            <a:endParaRPr lang="en-US"/>
+          </a:p>
+        </p:txBody>
+      </p:sp>
+      <p:sp>
+        <p:nvSpPr>
+          <p:cNvPr id="3" name="Footer Placeholder 2">
+            <a:extLst>
+              <a:ext uri="{FF2B5EF4-FFF2-40B4-BE49-F238E27FC236}">
+                <a16:creationId xmlns:a16="http://schemas.microsoft.com/office/drawing/2014/main" id="{573B79BE-2C84-405A-A961-42F9D13F000C}"/>
+              </a:ext>
+            </a:extLst>
+          </p:cNvPr>
+          <p:cNvSpPr>
+            <a:spLocks noGrp="1"/>
+          </p:cNvSpPr>
+          <p:nvPr>
+            <p:ph type="ftr" sz="quarter" idx="11"/>
+          </p:nvPr>
+        </p:nvSpPr>
+        <p:spPr/>
+        <p:txBody>
+          <a:bodyPr/>
+          <a:lstStyle/>
+          <a:p>
+            <a:endParaRPr lang="en-US"/>
+          </a:p>
+        </p:txBody>
+      </p:sp>
+      <p:sp>
+        <p:nvSpPr>
+          <p:cNvPr id="4" name="Slide Number Placeholder 3">
+            <a:extLst>
+              <a:ext uri="{FF2B5EF4-FFF2-40B4-BE49-F238E27FC236}">
+                <a16:creationId xmlns:a16="http://schemas.microsoft.com/office/drawing/2014/main" id="{F5FAB8B6-474F-44AB-9C29-B0C8CC6C3E99}"/>
+              </a:ext>
+            </a:extLst>
+          </p:cNvPr>
+          <p:cNvSpPr>
+            <a:spLocks noGrp="1"/>
+          </p:cNvSpPr>
+          <p:nvPr>
+            <p:ph type="sldNum" sz="quarter" idx="12"/>
+          </p:nvPr>
+        </p:nvSpPr>
+        <p:spPr/>
+        <p:txBody>
+          <a:bodyPr/>
+          <a:lstStyle/>
+          <a:p>
+            <a:fld id="{36576177-7166-48FA-905C-416F917473F2}" type="slidenum">
+              <a:rPr lang="en-US" smtClean="0"/>
+              <a:t>‹#›</a:t>
+            </a:fld>
+            <a:endParaRPr lang="en-US"/>
+          </a:p>
+        </p:txBody>
+      </p:sp>
+    </p:spTree>
+    <p:extLst>
+      <p:ext uri="{BB962C8B-B14F-4D97-AF65-F5344CB8AC3E}">
+        <p14:creationId xmlns:p14="http://schemas.microsoft.com/office/powerpoint/2010/main" val="2838392514"/>
+      </p:ext>
+    </p:extLst>
+  </p:cSld>
+  <p:clrMapOvr>
+    <a:masterClrMapping/>
+  </p:clrMapOvr>
+</p:sldLayout>
+</file>
+
+<file path=ppt/slideLayouts/slideLayout19.xml><?xml version="1.0" encoding="utf-8"?>
+<p:sldLayout xmlns:a="http://schemas.openxmlformats.org/drawingml/2006/main" xmlns:r="http://schemas.openxmlformats.org/officeDocument/2006/relationships" xmlns:p="http://schemas.openxmlformats.org/presentationml/2006/main" type="objTx" preserve="1">
+  <p:cSld name="Content with Caption">
+    <p:spTree>
+      <p:nvGrpSpPr>
+        <p:cNvPr id="1" name=""/>
+        <p:cNvGrpSpPr/>
+        <p:nvPr/>
+      </p:nvGrpSpPr>
+      <p:grpSpPr>
+        <a:xfrm>
+          <a:off x="0" y="0"/>
+          <a:ext cx="0" cy="0"/>
+          <a:chOff x="0" y="0"/>
+          <a:chExt cx="0" cy="0"/>
+        </a:xfrm>
+      </p:grpSpPr>
+      <p:sp>
+        <p:nvSpPr>
+          <p:cNvPr id="2" name="Title 1">
+            <a:extLst>
+              <a:ext uri="{FF2B5EF4-FFF2-40B4-BE49-F238E27FC236}">
+                <a16:creationId xmlns:a16="http://schemas.microsoft.com/office/drawing/2014/main" id="{56ECCBFF-F8EF-4B3A-B88A-0FBF15E56156}"/>
+              </a:ext>
+            </a:extLst>
+          </p:cNvPr>
+          <p:cNvSpPr>
+            <a:spLocks noGrp="1"/>
+          </p:cNvSpPr>
+          <p:nvPr>
+            <p:ph type="title"/>
+          </p:nvPr>
+        </p:nvSpPr>
+        <p:spPr>
+          <a:xfrm>
+            <a:off x="503873" y="365760"/>
+            <a:ext cx="2359342" cy="1280160"/>
+          </a:xfrm>
+        </p:spPr>
+        <p:txBody>
+          <a:bodyPr anchor="b"/>
+          <a:lstStyle>
+            <a:lvl1pPr>
+              <a:defRPr sz="1920"/>
+            </a:lvl1pPr>
+          </a:lstStyle>
+          <a:p>
+            <a:r>
+              <a:rPr lang="en-US"/>
+              <a:t>Click to edit Master title style</a:t>
+            </a:r>
+          </a:p>
+        </p:txBody>
+      </p:sp>
+      <p:sp>
+        <p:nvSpPr>
+          <p:cNvPr id="3" name="Content Placeholder 2">
+            <a:extLst>
+              <a:ext uri="{FF2B5EF4-FFF2-40B4-BE49-F238E27FC236}">
+                <a16:creationId xmlns:a16="http://schemas.microsoft.com/office/drawing/2014/main" id="{0D03B73B-D9F5-4CB0-B47D-CF0FADECBF62}"/>
+              </a:ext>
+            </a:extLst>
+          </p:cNvPr>
+          <p:cNvSpPr>
+            <a:spLocks noGrp="1"/>
+          </p:cNvSpPr>
+          <p:nvPr>
+            <p:ph idx="1"/>
+          </p:nvPr>
+        </p:nvSpPr>
+        <p:spPr>
+          <a:xfrm>
+            <a:off x="3109913" y="789940"/>
+            <a:ext cx="3703320" cy="3898900"/>
+          </a:xfrm>
+        </p:spPr>
+        <p:txBody>
+          <a:bodyPr/>
+          <a:lstStyle>
+            <a:lvl1pPr>
+              <a:defRPr sz="1920"/>
+            </a:lvl1pPr>
+            <a:lvl2pPr>
+              <a:defRPr sz="1680"/>
+            </a:lvl2pPr>
+            <a:lvl3pPr>
+              <a:defRPr sz="1440"/>
+            </a:lvl3pPr>
+            <a:lvl4pPr>
+              <a:defRPr sz="1200"/>
+            </a:lvl4pPr>
+            <a:lvl5pPr>
+              <a:defRPr sz="1200"/>
+            </a:lvl5pPr>
+            <a:lvl6pPr>
+              <a:defRPr sz="1200"/>
+            </a:lvl6pPr>
+            <a:lvl7pPr>
+              <a:defRPr sz="1200"/>
+            </a:lvl7pPr>
+            <a:lvl8pPr>
+              <a:defRPr sz="1200"/>
+            </a:lvl8pPr>
+            <a:lvl9pPr>
+              <a:defRPr sz="1200"/>
+            </a:lvl9pPr>
+          </a:lstStyle>
+          <a:p>
+            <a:pPr lvl="0"/>
+            <a:r>
+              <a:rPr lang="en-US"/>
+              <a:t>Click to edit Master text styles</a:t>
+            </a:r>
+          </a:p>
+          <a:p>
+            <a:pPr lvl="1"/>
+            <a:r>
+              <a:rPr lang="en-US"/>
+              <a:t>Second level</a:t>
+            </a:r>
+          </a:p>
+          <a:p>
+            <a:pPr lvl="2"/>
+            <a:r>
+              <a:rPr lang="en-US"/>
+              <a:t>Third level</a:t>
+            </a:r>
+          </a:p>
+          <a:p>
+            <a:pPr lvl="3"/>
+            <a:r>
+              <a:rPr lang="en-US"/>
+              <a:t>Fourth level</a:t>
+            </a:r>
+          </a:p>
+          <a:p>
+            <a:pPr lvl="4"/>
+            <a:r>
+              <a:rPr lang="en-US"/>
+              <a:t>Fifth level</a:t>
+            </a:r>
+          </a:p>
+        </p:txBody>
+      </p:sp>
+      <p:sp>
+        <p:nvSpPr>
+          <p:cNvPr id="4" name="Text Placeholder 3">
+            <a:extLst>
+              <a:ext uri="{FF2B5EF4-FFF2-40B4-BE49-F238E27FC236}">
+                <a16:creationId xmlns:a16="http://schemas.microsoft.com/office/drawing/2014/main" id="{B9711D62-D56E-42E3-BA57-812CD90AF768}"/>
+              </a:ext>
+            </a:extLst>
+          </p:cNvPr>
+          <p:cNvSpPr>
+            <a:spLocks noGrp="1"/>
+          </p:cNvSpPr>
+          <p:nvPr>
+            <p:ph type="body" sz="half" idx="2"/>
+          </p:nvPr>
+        </p:nvSpPr>
+        <p:spPr>
+          <a:xfrm>
+            <a:off x="503873" y="1645920"/>
+            <a:ext cx="2359342" cy="3049270"/>
+          </a:xfrm>
+        </p:spPr>
+        <p:txBody>
+          <a:bodyPr/>
+          <a:lstStyle>
+            <a:lvl1pPr marL="0" indent="0">
+              <a:buNone/>
+              <a:defRPr sz="960"/>
+            </a:lvl1pPr>
+            <a:lvl2pPr marL="274320" indent="0">
+              <a:buNone/>
+              <a:defRPr sz="840"/>
+            </a:lvl2pPr>
+            <a:lvl3pPr marL="548640" indent="0">
+              <a:buNone/>
+              <a:defRPr sz="720"/>
+            </a:lvl3pPr>
+            <a:lvl4pPr marL="822960" indent="0">
+              <a:buNone/>
+              <a:defRPr sz="600"/>
+            </a:lvl4pPr>
+            <a:lvl5pPr marL="1097280" indent="0">
+              <a:buNone/>
+              <a:defRPr sz="600"/>
+            </a:lvl5pPr>
+            <a:lvl6pPr marL="1371600" indent="0">
+              <a:buNone/>
+              <a:defRPr sz="600"/>
+            </a:lvl6pPr>
+            <a:lvl7pPr marL="1645920" indent="0">
+              <a:buNone/>
+              <a:defRPr sz="600"/>
+            </a:lvl7pPr>
+            <a:lvl8pPr marL="1920240" indent="0">
+              <a:buNone/>
+              <a:defRPr sz="600"/>
+            </a:lvl8pPr>
+            <a:lvl9pPr marL="2194560" indent="0">
+              <a:buNone/>
+              <a:defRPr sz="600"/>
+            </a:lvl9pPr>
+          </a:lstStyle>
+          <a:p>
+            <a:pPr lvl="0"/>
+            <a:r>
+              <a:rPr lang="en-US"/>
+              <a:t>Click to edit Master text styles</a:t>
+            </a:r>
+          </a:p>
+        </p:txBody>
+      </p:sp>
+      <p:sp>
+        <p:nvSpPr>
+          <p:cNvPr id="5" name="Date Placeholder 4">
+            <a:extLst>
+              <a:ext uri="{FF2B5EF4-FFF2-40B4-BE49-F238E27FC236}">
+                <a16:creationId xmlns:a16="http://schemas.microsoft.com/office/drawing/2014/main" id="{61F03A98-0775-444B-AD16-E748EDAD56B5}"/>
+              </a:ext>
+            </a:extLst>
+          </p:cNvPr>
+          <p:cNvSpPr>
+            <a:spLocks noGrp="1"/>
+          </p:cNvSpPr>
+          <p:nvPr>
+            <p:ph type="dt" sz="half" idx="10"/>
+          </p:nvPr>
+        </p:nvSpPr>
+        <p:spPr/>
+        <p:txBody>
+          <a:bodyPr/>
+          <a:lstStyle/>
+          <a:p>
+            <a:fld id="{D793FBF9-7FD6-43C2-8557-8F5C9FBE75EA}" type="datetimeFigureOut">
+              <a:rPr lang="en-US" smtClean="0"/>
+              <a:t>1/14/2020</a:t>
+            </a:fld>
+            <a:endParaRPr lang="en-US"/>
+          </a:p>
+        </p:txBody>
+      </p:sp>
+      <p:sp>
+        <p:nvSpPr>
+          <p:cNvPr id="6" name="Footer Placeholder 5">
+            <a:extLst>
+              <a:ext uri="{FF2B5EF4-FFF2-40B4-BE49-F238E27FC236}">
+                <a16:creationId xmlns:a16="http://schemas.microsoft.com/office/drawing/2014/main" id="{92608346-BE6D-40B6-A605-7FEB2450C790}"/>
+              </a:ext>
+            </a:extLst>
+          </p:cNvPr>
+          <p:cNvSpPr>
+            <a:spLocks noGrp="1"/>
+          </p:cNvSpPr>
+          <p:nvPr>
+            <p:ph type="ftr" sz="quarter" idx="11"/>
+          </p:nvPr>
+        </p:nvSpPr>
+        <p:spPr/>
+        <p:txBody>
+          <a:bodyPr/>
+          <a:lstStyle/>
+          <a:p>
+            <a:endParaRPr lang="en-US"/>
+          </a:p>
+        </p:txBody>
+      </p:sp>
+      <p:sp>
+        <p:nvSpPr>
+          <p:cNvPr id="7" name="Slide Number Placeholder 6">
+            <a:extLst>
+              <a:ext uri="{FF2B5EF4-FFF2-40B4-BE49-F238E27FC236}">
+                <a16:creationId xmlns:a16="http://schemas.microsoft.com/office/drawing/2014/main" id="{4F307C58-6A3A-4647-99D3-5C6353ED609B}"/>
+              </a:ext>
+            </a:extLst>
+          </p:cNvPr>
+          <p:cNvSpPr>
+            <a:spLocks noGrp="1"/>
+          </p:cNvSpPr>
+          <p:nvPr>
+            <p:ph type="sldNum" sz="quarter" idx="12"/>
+          </p:nvPr>
+        </p:nvSpPr>
+        <p:spPr/>
+        <p:txBody>
+          <a:bodyPr/>
+          <a:lstStyle/>
+          <a:p>
+            <a:fld id="{36576177-7166-48FA-905C-416F917473F2}" type="slidenum">
+              <a:rPr lang="en-US" smtClean="0"/>
+              <a:t>‹#›</a:t>
+            </a:fld>
+            <a:endParaRPr lang="en-US"/>
+          </a:p>
+        </p:txBody>
+      </p:sp>
+    </p:spTree>
+    <p:extLst>
+      <p:ext uri="{BB962C8B-B14F-4D97-AF65-F5344CB8AC3E}">
+        <p14:creationId xmlns:p14="http://schemas.microsoft.com/office/powerpoint/2010/main" val="3950726308"/>
       </p:ext>
     </p:extLst>
   </p:cSld>
@@ -764,7 +2701,7 @@
           <a:p>
             <a:fld id="{DF9B7973-EE54-40B6-814D-4B97DB32E5B3}" type="datetimeFigureOut">
               <a:rPr lang="en-US" smtClean="0"/>
-              <a:t>10/1/2019</a:t>
+              <a:t>1/14/2020</a:t>
             </a:fld>
             <a:endParaRPr lang="en-US"/>
           </a:p>
@@ -816,6 +2753,700 @@
     <p:extLst>
       <p:ext uri="{BB962C8B-B14F-4D97-AF65-F5344CB8AC3E}">
         <p14:creationId xmlns:p14="http://schemas.microsoft.com/office/powerpoint/2010/main" val="738673366"/>
+      </p:ext>
+    </p:extLst>
+  </p:cSld>
+  <p:clrMapOvr>
+    <a:masterClrMapping/>
+  </p:clrMapOvr>
+</p:sldLayout>
+</file>
+
+<file path=ppt/slideLayouts/slideLayout20.xml><?xml version="1.0" encoding="utf-8"?>
+<p:sldLayout xmlns:a="http://schemas.openxmlformats.org/drawingml/2006/main" xmlns:r="http://schemas.openxmlformats.org/officeDocument/2006/relationships" xmlns:p="http://schemas.openxmlformats.org/presentationml/2006/main" type="picTx" preserve="1">
+  <p:cSld name="Picture with Caption">
+    <p:spTree>
+      <p:nvGrpSpPr>
+        <p:cNvPr id="1" name=""/>
+        <p:cNvGrpSpPr/>
+        <p:nvPr/>
+      </p:nvGrpSpPr>
+      <p:grpSpPr>
+        <a:xfrm>
+          <a:off x="0" y="0"/>
+          <a:ext cx="0" cy="0"/>
+          <a:chOff x="0" y="0"/>
+          <a:chExt cx="0" cy="0"/>
+        </a:xfrm>
+      </p:grpSpPr>
+      <p:sp>
+        <p:nvSpPr>
+          <p:cNvPr id="2" name="Title 1">
+            <a:extLst>
+              <a:ext uri="{FF2B5EF4-FFF2-40B4-BE49-F238E27FC236}">
+                <a16:creationId xmlns:a16="http://schemas.microsoft.com/office/drawing/2014/main" id="{1BA9C277-99AF-46C7-AD04-8FF4B4321D50}"/>
+              </a:ext>
+            </a:extLst>
+          </p:cNvPr>
+          <p:cNvSpPr>
+            <a:spLocks noGrp="1"/>
+          </p:cNvSpPr>
+          <p:nvPr>
+            <p:ph type="title"/>
+          </p:nvPr>
+        </p:nvSpPr>
+        <p:spPr>
+          <a:xfrm>
+            <a:off x="503873" y="365760"/>
+            <a:ext cx="2359342" cy="1280160"/>
+          </a:xfrm>
+        </p:spPr>
+        <p:txBody>
+          <a:bodyPr anchor="b"/>
+          <a:lstStyle>
+            <a:lvl1pPr>
+              <a:defRPr sz="1920"/>
+            </a:lvl1pPr>
+          </a:lstStyle>
+          <a:p>
+            <a:r>
+              <a:rPr lang="en-US"/>
+              <a:t>Click to edit Master title style</a:t>
+            </a:r>
+          </a:p>
+        </p:txBody>
+      </p:sp>
+      <p:sp>
+        <p:nvSpPr>
+          <p:cNvPr id="3" name="Picture Placeholder 2">
+            <a:extLst>
+              <a:ext uri="{FF2B5EF4-FFF2-40B4-BE49-F238E27FC236}">
+                <a16:creationId xmlns:a16="http://schemas.microsoft.com/office/drawing/2014/main" id="{338A1751-C3F6-4D45-873B-0370268CA35A}"/>
+              </a:ext>
+            </a:extLst>
+          </p:cNvPr>
+          <p:cNvSpPr>
+            <a:spLocks noGrp="1"/>
+          </p:cNvSpPr>
+          <p:nvPr>
+            <p:ph type="pic" idx="1"/>
+          </p:nvPr>
+        </p:nvSpPr>
+        <p:spPr>
+          <a:xfrm>
+            <a:off x="3109913" y="789940"/>
+            <a:ext cx="3703320" cy="3898900"/>
+          </a:xfrm>
+        </p:spPr>
+        <p:txBody>
+          <a:bodyPr/>
+          <a:lstStyle>
+            <a:lvl1pPr marL="0" indent="0">
+              <a:buNone/>
+              <a:defRPr sz="1920"/>
+            </a:lvl1pPr>
+            <a:lvl2pPr marL="274320" indent="0">
+              <a:buNone/>
+              <a:defRPr sz="1680"/>
+            </a:lvl2pPr>
+            <a:lvl3pPr marL="548640" indent="0">
+              <a:buNone/>
+              <a:defRPr sz="1440"/>
+            </a:lvl3pPr>
+            <a:lvl4pPr marL="822960" indent="0">
+              <a:buNone/>
+              <a:defRPr sz="1200"/>
+            </a:lvl4pPr>
+            <a:lvl5pPr marL="1097280" indent="0">
+              <a:buNone/>
+              <a:defRPr sz="1200"/>
+            </a:lvl5pPr>
+            <a:lvl6pPr marL="1371600" indent="0">
+              <a:buNone/>
+              <a:defRPr sz="1200"/>
+            </a:lvl6pPr>
+            <a:lvl7pPr marL="1645920" indent="0">
+              <a:buNone/>
+              <a:defRPr sz="1200"/>
+            </a:lvl7pPr>
+            <a:lvl8pPr marL="1920240" indent="0">
+              <a:buNone/>
+              <a:defRPr sz="1200"/>
+            </a:lvl8pPr>
+            <a:lvl9pPr marL="2194560" indent="0">
+              <a:buNone/>
+              <a:defRPr sz="1200"/>
+            </a:lvl9pPr>
+          </a:lstStyle>
+          <a:p>
+            <a:endParaRPr lang="en-US"/>
+          </a:p>
+        </p:txBody>
+      </p:sp>
+      <p:sp>
+        <p:nvSpPr>
+          <p:cNvPr id="4" name="Text Placeholder 3">
+            <a:extLst>
+              <a:ext uri="{FF2B5EF4-FFF2-40B4-BE49-F238E27FC236}">
+                <a16:creationId xmlns:a16="http://schemas.microsoft.com/office/drawing/2014/main" id="{E684DCED-CCFB-48D7-84F1-36046EB07425}"/>
+              </a:ext>
+            </a:extLst>
+          </p:cNvPr>
+          <p:cNvSpPr>
+            <a:spLocks noGrp="1"/>
+          </p:cNvSpPr>
+          <p:nvPr>
+            <p:ph type="body" sz="half" idx="2"/>
+          </p:nvPr>
+        </p:nvSpPr>
+        <p:spPr>
+          <a:xfrm>
+            <a:off x="503873" y="1645920"/>
+            <a:ext cx="2359342" cy="3049270"/>
+          </a:xfrm>
+        </p:spPr>
+        <p:txBody>
+          <a:bodyPr/>
+          <a:lstStyle>
+            <a:lvl1pPr marL="0" indent="0">
+              <a:buNone/>
+              <a:defRPr sz="960"/>
+            </a:lvl1pPr>
+            <a:lvl2pPr marL="274320" indent="0">
+              <a:buNone/>
+              <a:defRPr sz="840"/>
+            </a:lvl2pPr>
+            <a:lvl3pPr marL="548640" indent="0">
+              <a:buNone/>
+              <a:defRPr sz="720"/>
+            </a:lvl3pPr>
+            <a:lvl4pPr marL="822960" indent="0">
+              <a:buNone/>
+              <a:defRPr sz="600"/>
+            </a:lvl4pPr>
+            <a:lvl5pPr marL="1097280" indent="0">
+              <a:buNone/>
+              <a:defRPr sz="600"/>
+            </a:lvl5pPr>
+            <a:lvl6pPr marL="1371600" indent="0">
+              <a:buNone/>
+              <a:defRPr sz="600"/>
+            </a:lvl6pPr>
+            <a:lvl7pPr marL="1645920" indent="0">
+              <a:buNone/>
+              <a:defRPr sz="600"/>
+            </a:lvl7pPr>
+            <a:lvl8pPr marL="1920240" indent="0">
+              <a:buNone/>
+              <a:defRPr sz="600"/>
+            </a:lvl8pPr>
+            <a:lvl9pPr marL="2194560" indent="0">
+              <a:buNone/>
+              <a:defRPr sz="600"/>
+            </a:lvl9pPr>
+          </a:lstStyle>
+          <a:p>
+            <a:pPr lvl="0"/>
+            <a:r>
+              <a:rPr lang="en-US"/>
+              <a:t>Click to edit Master text styles</a:t>
+            </a:r>
+          </a:p>
+        </p:txBody>
+      </p:sp>
+      <p:sp>
+        <p:nvSpPr>
+          <p:cNvPr id="5" name="Date Placeholder 4">
+            <a:extLst>
+              <a:ext uri="{FF2B5EF4-FFF2-40B4-BE49-F238E27FC236}">
+                <a16:creationId xmlns:a16="http://schemas.microsoft.com/office/drawing/2014/main" id="{77A31287-621A-4AB8-B7A9-5D3F010E09FC}"/>
+              </a:ext>
+            </a:extLst>
+          </p:cNvPr>
+          <p:cNvSpPr>
+            <a:spLocks noGrp="1"/>
+          </p:cNvSpPr>
+          <p:nvPr>
+            <p:ph type="dt" sz="half" idx="10"/>
+          </p:nvPr>
+        </p:nvSpPr>
+        <p:spPr/>
+        <p:txBody>
+          <a:bodyPr/>
+          <a:lstStyle/>
+          <a:p>
+            <a:fld id="{D793FBF9-7FD6-43C2-8557-8F5C9FBE75EA}" type="datetimeFigureOut">
+              <a:rPr lang="en-US" smtClean="0"/>
+              <a:t>1/14/2020</a:t>
+            </a:fld>
+            <a:endParaRPr lang="en-US"/>
+          </a:p>
+        </p:txBody>
+      </p:sp>
+      <p:sp>
+        <p:nvSpPr>
+          <p:cNvPr id="6" name="Footer Placeholder 5">
+            <a:extLst>
+              <a:ext uri="{FF2B5EF4-FFF2-40B4-BE49-F238E27FC236}">
+                <a16:creationId xmlns:a16="http://schemas.microsoft.com/office/drawing/2014/main" id="{5679A23B-981D-46A8-B6F7-4D3B54A9CC4B}"/>
+              </a:ext>
+            </a:extLst>
+          </p:cNvPr>
+          <p:cNvSpPr>
+            <a:spLocks noGrp="1"/>
+          </p:cNvSpPr>
+          <p:nvPr>
+            <p:ph type="ftr" sz="quarter" idx="11"/>
+          </p:nvPr>
+        </p:nvSpPr>
+        <p:spPr/>
+        <p:txBody>
+          <a:bodyPr/>
+          <a:lstStyle/>
+          <a:p>
+            <a:endParaRPr lang="en-US"/>
+          </a:p>
+        </p:txBody>
+      </p:sp>
+      <p:sp>
+        <p:nvSpPr>
+          <p:cNvPr id="7" name="Slide Number Placeholder 6">
+            <a:extLst>
+              <a:ext uri="{FF2B5EF4-FFF2-40B4-BE49-F238E27FC236}">
+                <a16:creationId xmlns:a16="http://schemas.microsoft.com/office/drawing/2014/main" id="{91B09E99-0027-481C-8933-359A2A5636C0}"/>
+              </a:ext>
+            </a:extLst>
+          </p:cNvPr>
+          <p:cNvSpPr>
+            <a:spLocks noGrp="1"/>
+          </p:cNvSpPr>
+          <p:nvPr>
+            <p:ph type="sldNum" sz="quarter" idx="12"/>
+          </p:nvPr>
+        </p:nvSpPr>
+        <p:spPr/>
+        <p:txBody>
+          <a:bodyPr/>
+          <a:lstStyle/>
+          <a:p>
+            <a:fld id="{36576177-7166-48FA-905C-416F917473F2}" type="slidenum">
+              <a:rPr lang="en-US" smtClean="0"/>
+              <a:t>‹#›</a:t>
+            </a:fld>
+            <a:endParaRPr lang="en-US"/>
+          </a:p>
+        </p:txBody>
+      </p:sp>
+    </p:spTree>
+    <p:extLst>
+      <p:ext uri="{BB962C8B-B14F-4D97-AF65-F5344CB8AC3E}">
+        <p14:creationId xmlns:p14="http://schemas.microsoft.com/office/powerpoint/2010/main" val="4178601431"/>
+      </p:ext>
+    </p:extLst>
+  </p:cSld>
+  <p:clrMapOvr>
+    <a:masterClrMapping/>
+  </p:clrMapOvr>
+</p:sldLayout>
+</file>
+
+<file path=ppt/slideLayouts/slideLayout21.xml><?xml version="1.0" encoding="utf-8"?>
+<p:sldLayout xmlns:a="http://schemas.openxmlformats.org/drawingml/2006/main" xmlns:r="http://schemas.openxmlformats.org/officeDocument/2006/relationships" xmlns:p="http://schemas.openxmlformats.org/presentationml/2006/main" type="vertTx" preserve="1">
+  <p:cSld name="Title and Vertical Text">
+    <p:spTree>
+      <p:nvGrpSpPr>
+        <p:cNvPr id="1" name=""/>
+        <p:cNvGrpSpPr/>
+        <p:nvPr/>
+      </p:nvGrpSpPr>
+      <p:grpSpPr>
+        <a:xfrm>
+          <a:off x="0" y="0"/>
+          <a:ext cx="0" cy="0"/>
+          <a:chOff x="0" y="0"/>
+          <a:chExt cx="0" cy="0"/>
+        </a:xfrm>
+      </p:grpSpPr>
+      <p:sp>
+        <p:nvSpPr>
+          <p:cNvPr id="2" name="Title 1">
+            <a:extLst>
+              <a:ext uri="{FF2B5EF4-FFF2-40B4-BE49-F238E27FC236}">
+                <a16:creationId xmlns:a16="http://schemas.microsoft.com/office/drawing/2014/main" id="{2A8EF736-72D4-461A-822C-521F204180B5}"/>
+              </a:ext>
+            </a:extLst>
+          </p:cNvPr>
+          <p:cNvSpPr>
+            <a:spLocks noGrp="1"/>
+          </p:cNvSpPr>
+          <p:nvPr>
+            <p:ph type="title"/>
+          </p:nvPr>
+        </p:nvSpPr>
+        <p:spPr/>
+        <p:txBody>
+          <a:bodyPr/>
+          <a:lstStyle/>
+          <a:p>
+            <a:r>
+              <a:rPr lang="en-US"/>
+              <a:t>Click to edit Master title style</a:t>
+            </a:r>
+          </a:p>
+        </p:txBody>
+      </p:sp>
+      <p:sp>
+        <p:nvSpPr>
+          <p:cNvPr id="3" name="Vertical Text Placeholder 2">
+            <a:extLst>
+              <a:ext uri="{FF2B5EF4-FFF2-40B4-BE49-F238E27FC236}">
+                <a16:creationId xmlns:a16="http://schemas.microsoft.com/office/drawing/2014/main" id="{50B5A255-8853-4148-80EA-2A7F8E91306F}"/>
+              </a:ext>
+            </a:extLst>
+          </p:cNvPr>
+          <p:cNvSpPr>
+            <a:spLocks noGrp="1"/>
+          </p:cNvSpPr>
+          <p:nvPr>
+            <p:ph type="body" orient="vert" idx="1"/>
+          </p:nvPr>
+        </p:nvSpPr>
+        <p:spPr/>
+        <p:txBody>
+          <a:bodyPr vert="eaVert"/>
+          <a:lstStyle/>
+          <a:p>
+            <a:pPr lvl="0"/>
+            <a:r>
+              <a:rPr lang="en-US"/>
+              <a:t>Click to edit Master text styles</a:t>
+            </a:r>
+          </a:p>
+          <a:p>
+            <a:pPr lvl="1"/>
+            <a:r>
+              <a:rPr lang="en-US"/>
+              <a:t>Second level</a:t>
+            </a:r>
+          </a:p>
+          <a:p>
+            <a:pPr lvl="2"/>
+            <a:r>
+              <a:rPr lang="en-US"/>
+              <a:t>Third level</a:t>
+            </a:r>
+          </a:p>
+          <a:p>
+            <a:pPr lvl="3"/>
+            <a:r>
+              <a:rPr lang="en-US"/>
+              <a:t>Fourth level</a:t>
+            </a:r>
+          </a:p>
+          <a:p>
+            <a:pPr lvl="4"/>
+            <a:r>
+              <a:rPr lang="en-US"/>
+              <a:t>Fifth level</a:t>
+            </a:r>
+          </a:p>
+        </p:txBody>
+      </p:sp>
+      <p:sp>
+        <p:nvSpPr>
+          <p:cNvPr id="4" name="Date Placeholder 3">
+            <a:extLst>
+              <a:ext uri="{FF2B5EF4-FFF2-40B4-BE49-F238E27FC236}">
+                <a16:creationId xmlns:a16="http://schemas.microsoft.com/office/drawing/2014/main" id="{1ECBB7A1-4116-4693-A42A-53EFE6B8F5BC}"/>
+              </a:ext>
+            </a:extLst>
+          </p:cNvPr>
+          <p:cNvSpPr>
+            <a:spLocks noGrp="1"/>
+          </p:cNvSpPr>
+          <p:nvPr>
+            <p:ph type="dt" sz="half" idx="10"/>
+          </p:nvPr>
+        </p:nvSpPr>
+        <p:spPr/>
+        <p:txBody>
+          <a:bodyPr/>
+          <a:lstStyle/>
+          <a:p>
+            <a:fld id="{D793FBF9-7FD6-43C2-8557-8F5C9FBE75EA}" type="datetimeFigureOut">
+              <a:rPr lang="en-US" smtClean="0"/>
+              <a:t>1/14/2020</a:t>
+            </a:fld>
+            <a:endParaRPr lang="en-US"/>
+          </a:p>
+        </p:txBody>
+      </p:sp>
+      <p:sp>
+        <p:nvSpPr>
+          <p:cNvPr id="5" name="Footer Placeholder 4">
+            <a:extLst>
+              <a:ext uri="{FF2B5EF4-FFF2-40B4-BE49-F238E27FC236}">
+                <a16:creationId xmlns:a16="http://schemas.microsoft.com/office/drawing/2014/main" id="{CF25834A-DF2C-4F15-9507-A0FC40047ED6}"/>
+              </a:ext>
+            </a:extLst>
+          </p:cNvPr>
+          <p:cNvSpPr>
+            <a:spLocks noGrp="1"/>
+          </p:cNvSpPr>
+          <p:nvPr>
+            <p:ph type="ftr" sz="quarter" idx="11"/>
+          </p:nvPr>
+        </p:nvSpPr>
+        <p:spPr/>
+        <p:txBody>
+          <a:bodyPr/>
+          <a:lstStyle/>
+          <a:p>
+            <a:endParaRPr lang="en-US"/>
+          </a:p>
+        </p:txBody>
+      </p:sp>
+      <p:sp>
+        <p:nvSpPr>
+          <p:cNvPr id="6" name="Slide Number Placeholder 5">
+            <a:extLst>
+              <a:ext uri="{FF2B5EF4-FFF2-40B4-BE49-F238E27FC236}">
+                <a16:creationId xmlns:a16="http://schemas.microsoft.com/office/drawing/2014/main" id="{DA43FDED-EA7B-4AAE-9262-14955FFFEA18}"/>
+              </a:ext>
+            </a:extLst>
+          </p:cNvPr>
+          <p:cNvSpPr>
+            <a:spLocks noGrp="1"/>
+          </p:cNvSpPr>
+          <p:nvPr>
+            <p:ph type="sldNum" sz="quarter" idx="12"/>
+          </p:nvPr>
+        </p:nvSpPr>
+        <p:spPr/>
+        <p:txBody>
+          <a:bodyPr/>
+          <a:lstStyle/>
+          <a:p>
+            <a:fld id="{36576177-7166-48FA-905C-416F917473F2}" type="slidenum">
+              <a:rPr lang="en-US" smtClean="0"/>
+              <a:t>‹#›</a:t>
+            </a:fld>
+            <a:endParaRPr lang="en-US"/>
+          </a:p>
+        </p:txBody>
+      </p:sp>
+    </p:spTree>
+    <p:extLst>
+      <p:ext uri="{BB962C8B-B14F-4D97-AF65-F5344CB8AC3E}">
+        <p14:creationId xmlns:p14="http://schemas.microsoft.com/office/powerpoint/2010/main" val="3880466373"/>
+      </p:ext>
+    </p:extLst>
+  </p:cSld>
+  <p:clrMapOvr>
+    <a:masterClrMapping/>
+  </p:clrMapOvr>
+</p:sldLayout>
+</file>
+
+<file path=ppt/slideLayouts/slideLayout22.xml><?xml version="1.0" encoding="utf-8"?>
+<p:sldLayout xmlns:a="http://schemas.openxmlformats.org/drawingml/2006/main" xmlns:r="http://schemas.openxmlformats.org/officeDocument/2006/relationships" xmlns:p="http://schemas.openxmlformats.org/presentationml/2006/main" type="vertTitleAndTx" preserve="1">
+  <p:cSld name="Vertical Title and Text">
+    <p:spTree>
+      <p:nvGrpSpPr>
+        <p:cNvPr id="1" name=""/>
+        <p:cNvGrpSpPr/>
+        <p:nvPr/>
+      </p:nvGrpSpPr>
+      <p:grpSpPr>
+        <a:xfrm>
+          <a:off x="0" y="0"/>
+          <a:ext cx="0" cy="0"/>
+          <a:chOff x="0" y="0"/>
+          <a:chExt cx="0" cy="0"/>
+        </a:xfrm>
+      </p:grpSpPr>
+      <p:sp>
+        <p:nvSpPr>
+          <p:cNvPr id="2" name="Vertical Title 1">
+            <a:extLst>
+              <a:ext uri="{FF2B5EF4-FFF2-40B4-BE49-F238E27FC236}">
+                <a16:creationId xmlns:a16="http://schemas.microsoft.com/office/drawing/2014/main" id="{B42CDBA5-D519-4786-91F2-3610C1BF4D06}"/>
+              </a:ext>
+            </a:extLst>
+          </p:cNvPr>
+          <p:cNvSpPr>
+            <a:spLocks noGrp="1"/>
+          </p:cNvSpPr>
+          <p:nvPr>
+            <p:ph type="title" orient="vert"/>
+          </p:nvPr>
+        </p:nvSpPr>
+        <p:spPr>
+          <a:xfrm>
+            <a:off x="5234940" y="292100"/>
+            <a:ext cx="1577340" cy="4649470"/>
+          </a:xfrm>
+        </p:spPr>
+        <p:txBody>
+          <a:bodyPr vert="eaVert"/>
+          <a:lstStyle/>
+          <a:p>
+            <a:r>
+              <a:rPr lang="en-US"/>
+              <a:t>Click to edit Master title style</a:t>
+            </a:r>
+          </a:p>
+        </p:txBody>
+      </p:sp>
+      <p:sp>
+        <p:nvSpPr>
+          <p:cNvPr id="3" name="Vertical Text Placeholder 2">
+            <a:extLst>
+              <a:ext uri="{FF2B5EF4-FFF2-40B4-BE49-F238E27FC236}">
+                <a16:creationId xmlns:a16="http://schemas.microsoft.com/office/drawing/2014/main" id="{8EBA49D5-789E-4B9A-B118-B8A726280DF7}"/>
+              </a:ext>
+            </a:extLst>
+          </p:cNvPr>
+          <p:cNvSpPr>
+            <a:spLocks noGrp="1"/>
+          </p:cNvSpPr>
+          <p:nvPr>
+            <p:ph type="body" orient="vert" idx="1"/>
+          </p:nvPr>
+        </p:nvSpPr>
+        <p:spPr>
+          <a:xfrm>
+            <a:off x="502920" y="292100"/>
+            <a:ext cx="4640580" cy="4649470"/>
+          </a:xfrm>
+        </p:spPr>
+        <p:txBody>
+          <a:bodyPr vert="eaVert"/>
+          <a:lstStyle/>
+          <a:p>
+            <a:pPr lvl="0"/>
+            <a:r>
+              <a:rPr lang="en-US"/>
+              <a:t>Click to edit Master text styles</a:t>
+            </a:r>
+          </a:p>
+          <a:p>
+            <a:pPr lvl="1"/>
+            <a:r>
+              <a:rPr lang="en-US"/>
+              <a:t>Second level</a:t>
+            </a:r>
+          </a:p>
+          <a:p>
+            <a:pPr lvl="2"/>
+            <a:r>
+              <a:rPr lang="en-US"/>
+              <a:t>Third level</a:t>
+            </a:r>
+          </a:p>
+          <a:p>
+            <a:pPr lvl="3"/>
+            <a:r>
+              <a:rPr lang="en-US"/>
+              <a:t>Fourth level</a:t>
+            </a:r>
+          </a:p>
+          <a:p>
+            <a:pPr lvl="4"/>
+            <a:r>
+              <a:rPr lang="en-US"/>
+              <a:t>Fifth level</a:t>
+            </a:r>
+          </a:p>
+        </p:txBody>
+      </p:sp>
+      <p:sp>
+        <p:nvSpPr>
+          <p:cNvPr id="4" name="Date Placeholder 3">
+            <a:extLst>
+              <a:ext uri="{FF2B5EF4-FFF2-40B4-BE49-F238E27FC236}">
+                <a16:creationId xmlns:a16="http://schemas.microsoft.com/office/drawing/2014/main" id="{681AE4B1-952F-40DA-8310-26CBC673089A}"/>
+              </a:ext>
+            </a:extLst>
+          </p:cNvPr>
+          <p:cNvSpPr>
+            <a:spLocks noGrp="1"/>
+          </p:cNvSpPr>
+          <p:nvPr>
+            <p:ph type="dt" sz="half" idx="10"/>
+          </p:nvPr>
+        </p:nvSpPr>
+        <p:spPr/>
+        <p:txBody>
+          <a:bodyPr/>
+          <a:lstStyle/>
+          <a:p>
+            <a:fld id="{D793FBF9-7FD6-43C2-8557-8F5C9FBE75EA}" type="datetimeFigureOut">
+              <a:rPr lang="en-US" smtClean="0"/>
+              <a:t>1/14/2020</a:t>
+            </a:fld>
+            <a:endParaRPr lang="en-US"/>
+          </a:p>
+        </p:txBody>
+      </p:sp>
+      <p:sp>
+        <p:nvSpPr>
+          <p:cNvPr id="5" name="Footer Placeholder 4">
+            <a:extLst>
+              <a:ext uri="{FF2B5EF4-FFF2-40B4-BE49-F238E27FC236}">
+                <a16:creationId xmlns:a16="http://schemas.microsoft.com/office/drawing/2014/main" id="{53FC1ADA-3E8D-4EED-9DA5-3B4379054A0D}"/>
+              </a:ext>
+            </a:extLst>
+          </p:cNvPr>
+          <p:cNvSpPr>
+            <a:spLocks noGrp="1"/>
+          </p:cNvSpPr>
+          <p:nvPr>
+            <p:ph type="ftr" sz="quarter" idx="11"/>
+          </p:nvPr>
+        </p:nvSpPr>
+        <p:spPr/>
+        <p:txBody>
+          <a:bodyPr/>
+          <a:lstStyle/>
+          <a:p>
+            <a:endParaRPr lang="en-US"/>
+          </a:p>
+        </p:txBody>
+      </p:sp>
+      <p:sp>
+        <p:nvSpPr>
+          <p:cNvPr id="6" name="Slide Number Placeholder 5">
+            <a:extLst>
+              <a:ext uri="{FF2B5EF4-FFF2-40B4-BE49-F238E27FC236}">
+                <a16:creationId xmlns:a16="http://schemas.microsoft.com/office/drawing/2014/main" id="{5ED4F15F-4D33-4BE8-B309-66E925D5B8F4}"/>
+              </a:ext>
+            </a:extLst>
+          </p:cNvPr>
+          <p:cNvSpPr>
+            <a:spLocks noGrp="1"/>
+          </p:cNvSpPr>
+          <p:nvPr>
+            <p:ph type="sldNum" sz="quarter" idx="12"/>
+          </p:nvPr>
+        </p:nvSpPr>
+        <p:spPr/>
+        <p:txBody>
+          <a:bodyPr/>
+          <a:lstStyle/>
+          <a:p>
+            <a:fld id="{36576177-7166-48FA-905C-416F917473F2}" type="slidenum">
+              <a:rPr lang="en-US" smtClean="0"/>
+              <a:t>‹#›</a:t>
+            </a:fld>
+            <a:endParaRPr lang="en-US"/>
+          </a:p>
+        </p:txBody>
+      </p:sp>
+    </p:spTree>
+    <p:extLst>
+      <p:ext uri="{BB962C8B-B14F-4D97-AF65-F5344CB8AC3E}">
+        <p14:creationId xmlns:p14="http://schemas.microsoft.com/office/powerpoint/2010/main" val="2565802729"/>
       </p:ext>
     </p:extLst>
   </p:cSld>
@@ -1008,7 +3639,7 @@
           <a:p>
             <a:fld id="{DF9B7973-EE54-40B6-814D-4B97DB32E5B3}" type="datetimeFigureOut">
               <a:rPr lang="en-US" smtClean="0"/>
-              <a:t>10/1/2019</a:t>
+              <a:t>1/14/2020</a:t>
             </a:fld>
             <a:endParaRPr lang="en-US"/>
           </a:p>
@@ -1240,7 +3871,7 @@
           <a:p>
             <a:fld id="{DF9B7973-EE54-40B6-814D-4B97DB32E5B3}" type="datetimeFigureOut">
               <a:rPr lang="en-US" smtClean="0"/>
-              <a:t>10/1/2019</a:t>
+              <a:t>1/14/2020</a:t>
             </a:fld>
             <a:endParaRPr lang="en-US"/>
           </a:p>
@@ -1607,7 +4238,7 @@
           <a:p>
             <a:fld id="{DF9B7973-EE54-40B6-814D-4B97DB32E5B3}" type="datetimeFigureOut">
               <a:rPr lang="en-US" smtClean="0"/>
-              <a:t>10/1/2019</a:t>
+              <a:t>1/14/2020</a:t>
             </a:fld>
             <a:endParaRPr lang="en-US"/>
           </a:p>
@@ -1725,7 +4356,7 @@
           <a:p>
             <a:fld id="{DF9B7973-EE54-40B6-814D-4B97DB32E5B3}" type="datetimeFigureOut">
               <a:rPr lang="en-US" smtClean="0"/>
-              <a:t>10/1/2019</a:t>
+              <a:t>1/14/2020</a:t>
             </a:fld>
             <a:endParaRPr lang="en-US"/>
           </a:p>
@@ -1820,7 +4451,7 @@
           <a:p>
             <a:fld id="{DF9B7973-EE54-40B6-814D-4B97DB32E5B3}" type="datetimeFigureOut">
               <a:rPr lang="en-US" smtClean="0"/>
-              <a:t>10/1/2019</a:t>
+              <a:t>1/14/2020</a:t>
             </a:fld>
             <a:endParaRPr lang="en-US"/>
           </a:p>
@@ -2097,7 +4728,7 @@
           <a:p>
             <a:fld id="{DF9B7973-EE54-40B6-814D-4B97DB32E5B3}" type="datetimeFigureOut">
               <a:rPr lang="en-US" smtClean="0"/>
-              <a:t>10/1/2019</a:t>
+              <a:t>1/14/2020</a:t>
             </a:fld>
             <a:endParaRPr lang="en-US"/>
           </a:p>
@@ -2354,7 +4985,7 @@
           <a:p>
             <a:fld id="{DF9B7973-EE54-40B6-814D-4B97DB32E5B3}" type="datetimeFigureOut">
               <a:rPr lang="en-US" smtClean="0"/>
-              <a:t>10/1/2019</a:t>
+              <a:t>1/14/2020</a:t>
             </a:fld>
             <a:endParaRPr lang="en-US"/>
           </a:p>
@@ -2567,7 +5198,7 @@
           <a:p>
             <a:fld id="{DF9B7973-EE54-40B6-814D-4B97DB32E5B3}" type="datetimeFigureOut">
               <a:rPr lang="en-US" smtClean="0"/>
-              <a:t>10/1/2019</a:t>
+              <a:t>1/14/2020</a:t>
             </a:fld>
             <a:endParaRPr lang="en-US"/>
           </a:p>
@@ -2942,6 +5573,574 @@
       </a:lvl8pPr>
       <a:lvl9pPr marL="2926080" algn="l" defTabSz="731520" rtl="0" eaLnBrk="1" latinLnBrk="0" hangingPunct="1">
         <a:defRPr sz="1440" kern="1200">
+          <a:solidFill>
+            <a:schemeClr val="tx1"/>
+          </a:solidFill>
+          <a:latin typeface="+mn-lt"/>
+          <a:ea typeface="+mn-ea"/>
+          <a:cs typeface="+mn-cs"/>
+        </a:defRPr>
+      </a:lvl9pPr>
+    </p:otherStyle>
+  </p:txStyles>
+</p:sldMaster>
+</file>
+
+<file path=ppt/slideMasters/slideMaster2.xml><?xml version="1.0" encoding="utf-8"?>
+<p:sldMaster xmlns:a="http://schemas.openxmlformats.org/drawingml/2006/main" xmlns:r="http://schemas.openxmlformats.org/officeDocument/2006/relationships" xmlns:p="http://schemas.openxmlformats.org/presentationml/2006/main">
+  <p:cSld>
+    <p:bg>
+      <p:bgRef idx="1001">
+        <a:schemeClr val="bg1"/>
+      </p:bgRef>
+    </p:bg>
+    <p:spTree>
+      <p:nvGrpSpPr>
+        <p:cNvPr id="1" name=""/>
+        <p:cNvGrpSpPr/>
+        <p:nvPr/>
+      </p:nvGrpSpPr>
+      <p:grpSpPr>
+        <a:xfrm>
+          <a:off x="0" y="0"/>
+          <a:ext cx="0" cy="0"/>
+          <a:chOff x="0" y="0"/>
+          <a:chExt cx="0" cy="0"/>
+        </a:xfrm>
+      </p:grpSpPr>
+      <p:sp>
+        <p:nvSpPr>
+          <p:cNvPr id="2" name="Title Placeholder 1">
+            <a:extLst>
+              <a:ext uri="{FF2B5EF4-FFF2-40B4-BE49-F238E27FC236}">
+                <a16:creationId xmlns:a16="http://schemas.microsoft.com/office/drawing/2014/main" id="{1E8D5954-ECF7-43A0-AB92-B4F850D0020A}"/>
+              </a:ext>
+            </a:extLst>
+          </p:cNvPr>
+          <p:cNvSpPr>
+            <a:spLocks noGrp="1"/>
+          </p:cNvSpPr>
+          <p:nvPr>
+            <p:ph type="title"/>
+          </p:nvPr>
+        </p:nvSpPr>
+        <p:spPr>
+          <a:xfrm>
+            <a:off x="502920" y="292101"/>
+            <a:ext cx="6309360" cy="1060450"/>
+          </a:xfrm>
+          <a:prstGeom prst="rect">
+            <a:avLst/>
+          </a:prstGeom>
+        </p:spPr>
+        <p:txBody>
+          <a:bodyPr vert="horz" lIns="91440" tIns="45720" rIns="91440" bIns="45720" rtlCol="0" anchor="ctr">
+            <a:normAutofit/>
+          </a:bodyPr>
+          <a:lstStyle/>
+          <a:p>
+            <a:r>
+              <a:rPr lang="en-US"/>
+              <a:t>Click to edit Master title style</a:t>
+            </a:r>
+          </a:p>
+        </p:txBody>
+      </p:sp>
+      <p:sp>
+        <p:nvSpPr>
+          <p:cNvPr id="3" name="Text Placeholder 2">
+            <a:extLst>
+              <a:ext uri="{FF2B5EF4-FFF2-40B4-BE49-F238E27FC236}">
+                <a16:creationId xmlns:a16="http://schemas.microsoft.com/office/drawing/2014/main" id="{26051F4A-82C5-462B-8B36-FEE7D375E0CD}"/>
+              </a:ext>
+            </a:extLst>
+          </p:cNvPr>
+          <p:cNvSpPr>
+            <a:spLocks noGrp="1"/>
+          </p:cNvSpPr>
+          <p:nvPr>
+            <p:ph type="body" idx="1"/>
+          </p:nvPr>
+        </p:nvSpPr>
+        <p:spPr>
+          <a:xfrm>
+            <a:off x="502920" y="1460500"/>
+            <a:ext cx="6309360" cy="3481070"/>
+          </a:xfrm>
+          <a:prstGeom prst="rect">
+            <a:avLst/>
+          </a:prstGeom>
+        </p:spPr>
+        <p:txBody>
+          <a:bodyPr vert="horz" lIns="91440" tIns="45720" rIns="91440" bIns="45720" rtlCol="0">
+            <a:normAutofit/>
+          </a:bodyPr>
+          <a:lstStyle/>
+          <a:p>
+            <a:pPr lvl="0"/>
+            <a:r>
+              <a:rPr lang="en-US"/>
+              <a:t>Click to edit Master text styles</a:t>
+            </a:r>
+          </a:p>
+          <a:p>
+            <a:pPr lvl="1"/>
+            <a:r>
+              <a:rPr lang="en-US"/>
+              <a:t>Second level</a:t>
+            </a:r>
+          </a:p>
+          <a:p>
+            <a:pPr lvl="2"/>
+            <a:r>
+              <a:rPr lang="en-US"/>
+              <a:t>Third level</a:t>
+            </a:r>
+          </a:p>
+          <a:p>
+            <a:pPr lvl="3"/>
+            <a:r>
+              <a:rPr lang="en-US"/>
+              <a:t>Fourth level</a:t>
+            </a:r>
+          </a:p>
+          <a:p>
+            <a:pPr lvl="4"/>
+            <a:r>
+              <a:rPr lang="en-US"/>
+              <a:t>Fifth level</a:t>
+            </a:r>
+          </a:p>
+        </p:txBody>
+      </p:sp>
+      <p:sp>
+        <p:nvSpPr>
+          <p:cNvPr id="4" name="Date Placeholder 3">
+            <a:extLst>
+              <a:ext uri="{FF2B5EF4-FFF2-40B4-BE49-F238E27FC236}">
+                <a16:creationId xmlns:a16="http://schemas.microsoft.com/office/drawing/2014/main" id="{B6204F06-9431-466B-983D-13ACE65B0E90}"/>
+              </a:ext>
+            </a:extLst>
+          </p:cNvPr>
+          <p:cNvSpPr>
+            <a:spLocks noGrp="1"/>
+          </p:cNvSpPr>
+          <p:nvPr>
+            <p:ph type="dt" sz="half" idx="2"/>
+          </p:nvPr>
+        </p:nvSpPr>
+        <p:spPr>
+          <a:xfrm>
+            <a:off x="502920" y="5085080"/>
+            <a:ext cx="1645920" cy="292100"/>
+          </a:xfrm>
+          <a:prstGeom prst="rect">
+            <a:avLst/>
+          </a:prstGeom>
+        </p:spPr>
+        <p:txBody>
+          <a:bodyPr vert="horz" lIns="91440" tIns="45720" rIns="91440" bIns="45720" rtlCol="0" anchor="ctr"/>
+          <a:lstStyle>
+            <a:lvl1pPr algn="l">
+              <a:defRPr sz="720">
+                <a:solidFill>
+                  <a:schemeClr val="tx1">
+                    <a:tint val="75000"/>
+                  </a:schemeClr>
+                </a:solidFill>
+              </a:defRPr>
+            </a:lvl1pPr>
+          </a:lstStyle>
+          <a:p>
+            <a:fld id="{D793FBF9-7FD6-43C2-8557-8F5C9FBE75EA}" type="datetimeFigureOut">
+              <a:rPr lang="en-US" smtClean="0"/>
+              <a:t>1/14/2020</a:t>
+            </a:fld>
+            <a:endParaRPr lang="en-US"/>
+          </a:p>
+        </p:txBody>
+      </p:sp>
+      <p:sp>
+        <p:nvSpPr>
+          <p:cNvPr id="5" name="Footer Placeholder 4">
+            <a:extLst>
+              <a:ext uri="{FF2B5EF4-FFF2-40B4-BE49-F238E27FC236}">
+                <a16:creationId xmlns:a16="http://schemas.microsoft.com/office/drawing/2014/main" id="{7C442B48-A7B4-4724-8003-EAA09A29D497}"/>
+              </a:ext>
+            </a:extLst>
+          </p:cNvPr>
+          <p:cNvSpPr>
+            <a:spLocks noGrp="1"/>
+          </p:cNvSpPr>
+          <p:nvPr>
+            <p:ph type="ftr" sz="quarter" idx="3"/>
+          </p:nvPr>
+        </p:nvSpPr>
+        <p:spPr>
+          <a:xfrm>
+            <a:off x="2423160" y="5085080"/>
+            <a:ext cx="2468880" cy="292100"/>
+          </a:xfrm>
+          <a:prstGeom prst="rect">
+            <a:avLst/>
+          </a:prstGeom>
+        </p:spPr>
+        <p:txBody>
+          <a:bodyPr vert="horz" lIns="91440" tIns="45720" rIns="91440" bIns="45720" rtlCol="0" anchor="ctr"/>
+          <a:lstStyle>
+            <a:lvl1pPr algn="ctr">
+              <a:defRPr sz="720">
+                <a:solidFill>
+                  <a:schemeClr val="tx1">
+                    <a:tint val="75000"/>
+                  </a:schemeClr>
+                </a:solidFill>
+              </a:defRPr>
+            </a:lvl1pPr>
+          </a:lstStyle>
+          <a:p>
+            <a:endParaRPr lang="en-US"/>
+          </a:p>
+        </p:txBody>
+      </p:sp>
+      <p:sp>
+        <p:nvSpPr>
+          <p:cNvPr id="6" name="Slide Number Placeholder 5">
+            <a:extLst>
+              <a:ext uri="{FF2B5EF4-FFF2-40B4-BE49-F238E27FC236}">
+                <a16:creationId xmlns:a16="http://schemas.microsoft.com/office/drawing/2014/main" id="{514BE5EA-3485-4BD4-AB72-D848C7A4FA0C}"/>
+              </a:ext>
+            </a:extLst>
+          </p:cNvPr>
+          <p:cNvSpPr>
+            <a:spLocks noGrp="1"/>
+          </p:cNvSpPr>
+          <p:nvPr>
+            <p:ph type="sldNum" sz="quarter" idx="4"/>
+          </p:nvPr>
+        </p:nvSpPr>
+        <p:spPr>
+          <a:xfrm>
+            <a:off x="5166360" y="5085080"/>
+            <a:ext cx="1645920" cy="292100"/>
+          </a:xfrm>
+          <a:prstGeom prst="rect">
+            <a:avLst/>
+          </a:prstGeom>
+        </p:spPr>
+        <p:txBody>
+          <a:bodyPr vert="horz" lIns="91440" tIns="45720" rIns="91440" bIns="45720" rtlCol="0" anchor="ctr"/>
+          <a:lstStyle>
+            <a:lvl1pPr algn="r">
+              <a:defRPr sz="720">
+                <a:solidFill>
+                  <a:schemeClr val="tx1">
+                    <a:tint val="75000"/>
+                  </a:schemeClr>
+                </a:solidFill>
+              </a:defRPr>
+            </a:lvl1pPr>
+          </a:lstStyle>
+          <a:p>
+            <a:fld id="{36576177-7166-48FA-905C-416F917473F2}" type="slidenum">
+              <a:rPr lang="en-US" smtClean="0"/>
+              <a:t>‹#›</a:t>
+            </a:fld>
+            <a:endParaRPr lang="en-US"/>
+          </a:p>
+        </p:txBody>
+      </p:sp>
+    </p:spTree>
+    <p:extLst>
+      <p:ext uri="{BB962C8B-B14F-4D97-AF65-F5344CB8AC3E}">
+        <p14:creationId xmlns:p14="http://schemas.microsoft.com/office/powerpoint/2010/main" val="495035067"/>
+      </p:ext>
+    </p:extLst>
+  </p:cSld>
+  <p:clrMap bg1="lt1" tx1="dk1" bg2="lt2" tx2="dk2" accent1="accent1" accent2="accent2" accent3="accent3" accent4="accent4" accent5="accent5" accent6="accent6" hlink="hlink" folHlink="folHlink"/>
+  <p:sldLayoutIdLst>
+    <p:sldLayoutId id="2147483697" r:id="rId1"/>
+    <p:sldLayoutId id="2147483698" r:id="rId2"/>
+    <p:sldLayoutId id="2147483699" r:id="rId3"/>
+    <p:sldLayoutId id="2147483700" r:id="rId4"/>
+    <p:sldLayoutId id="2147483701" r:id="rId5"/>
+    <p:sldLayoutId id="2147483702" r:id="rId6"/>
+    <p:sldLayoutId id="2147483703" r:id="rId7"/>
+    <p:sldLayoutId id="2147483704" r:id="rId8"/>
+    <p:sldLayoutId id="2147483705" r:id="rId9"/>
+    <p:sldLayoutId id="2147483706" r:id="rId10"/>
+    <p:sldLayoutId id="2147483707" r:id="rId11"/>
+  </p:sldLayoutIdLst>
+  <p:txStyles>
+    <p:titleStyle>
+      <a:lvl1pPr algn="l" defTabSz="548640" rtl="0" eaLnBrk="1" latinLnBrk="0" hangingPunct="1">
+        <a:lnSpc>
+          <a:spcPct val="90000"/>
+        </a:lnSpc>
+        <a:spcBef>
+          <a:spcPct val="0"/>
+        </a:spcBef>
+        <a:buNone/>
+        <a:defRPr sz="2640" kern="1200">
+          <a:solidFill>
+            <a:schemeClr val="tx1"/>
+          </a:solidFill>
+          <a:latin typeface="+mj-lt"/>
+          <a:ea typeface="+mj-ea"/>
+          <a:cs typeface="+mj-cs"/>
+        </a:defRPr>
+      </a:lvl1pPr>
+    </p:titleStyle>
+    <p:bodyStyle>
+      <a:lvl1pPr marL="137160" indent="-137160" algn="l" defTabSz="548640" rtl="0" eaLnBrk="1" latinLnBrk="0" hangingPunct="1">
+        <a:lnSpc>
+          <a:spcPct val="90000"/>
+        </a:lnSpc>
+        <a:spcBef>
+          <a:spcPts val="600"/>
+        </a:spcBef>
+        <a:buFont typeface="Arial" panose="020B0604020202020204" pitchFamily="34" charset="0"/>
+        <a:buChar char="•"/>
+        <a:defRPr sz="1680" kern="1200">
+          <a:solidFill>
+            <a:schemeClr val="tx1"/>
+          </a:solidFill>
+          <a:latin typeface="+mn-lt"/>
+          <a:ea typeface="+mn-ea"/>
+          <a:cs typeface="+mn-cs"/>
+        </a:defRPr>
+      </a:lvl1pPr>
+      <a:lvl2pPr marL="411480" indent="-137160" algn="l" defTabSz="548640" rtl="0" eaLnBrk="1" latinLnBrk="0" hangingPunct="1">
+        <a:lnSpc>
+          <a:spcPct val="90000"/>
+        </a:lnSpc>
+        <a:spcBef>
+          <a:spcPts val="300"/>
+        </a:spcBef>
+        <a:buFont typeface="Arial" panose="020B0604020202020204" pitchFamily="34" charset="0"/>
+        <a:buChar char="•"/>
+        <a:defRPr sz="1440" kern="1200">
+          <a:solidFill>
+            <a:schemeClr val="tx1"/>
+          </a:solidFill>
+          <a:latin typeface="+mn-lt"/>
+          <a:ea typeface="+mn-ea"/>
+          <a:cs typeface="+mn-cs"/>
+        </a:defRPr>
+      </a:lvl2pPr>
+      <a:lvl3pPr marL="685800" indent="-137160" algn="l" defTabSz="548640" rtl="0" eaLnBrk="1" latinLnBrk="0" hangingPunct="1">
+        <a:lnSpc>
+          <a:spcPct val="90000"/>
+        </a:lnSpc>
+        <a:spcBef>
+          <a:spcPts val="300"/>
+        </a:spcBef>
+        <a:buFont typeface="Arial" panose="020B0604020202020204" pitchFamily="34" charset="0"/>
+        <a:buChar char="•"/>
+        <a:defRPr sz="1200" kern="1200">
+          <a:solidFill>
+            <a:schemeClr val="tx1"/>
+          </a:solidFill>
+          <a:latin typeface="+mn-lt"/>
+          <a:ea typeface="+mn-ea"/>
+          <a:cs typeface="+mn-cs"/>
+        </a:defRPr>
+      </a:lvl3pPr>
+      <a:lvl4pPr marL="960120" indent="-137160" algn="l" defTabSz="548640" rtl="0" eaLnBrk="1" latinLnBrk="0" hangingPunct="1">
+        <a:lnSpc>
+          <a:spcPct val="90000"/>
+        </a:lnSpc>
+        <a:spcBef>
+          <a:spcPts val="300"/>
+        </a:spcBef>
+        <a:buFont typeface="Arial" panose="020B0604020202020204" pitchFamily="34" charset="0"/>
+        <a:buChar char="•"/>
+        <a:defRPr sz="1080" kern="1200">
+          <a:solidFill>
+            <a:schemeClr val="tx1"/>
+          </a:solidFill>
+          <a:latin typeface="+mn-lt"/>
+          <a:ea typeface="+mn-ea"/>
+          <a:cs typeface="+mn-cs"/>
+        </a:defRPr>
+      </a:lvl4pPr>
+      <a:lvl5pPr marL="1234440" indent="-137160" algn="l" defTabSz="548640" rtl="0" eaLnBrk="1" latinLnBrk="0" hangingPunct="1">
+        <a:lnSpc>
+          <a:spcPct val="90000"/>
+        </a:lnSpc>
+        <a:spcBef>
+          <a:spcPts val="300"/>
+        </a:spcBef>
+        <a:buFont typeface="Arial" panose="020B0604020202020204" pitchFamily="34" charset="0"/>
+        <a:buChar char="•"/>
+        <a:defRPr sz="1080" kern="1200">
+          <a:solidFill>
+            <a:schemeClr val="tx1"/>
+          </a:solidFill>
+          <a:latin typeface="+mn-lt"/>
+          <a:ea typeface="+mn-ea"/>
+          <a:cs typeface="+mn-cs"/>
+        </a:defRPr>
+      </a:lvl5pPr>
+      <a:lvl6pPr marL="1508760" indent="-137160" algn="l" defTabSz="548640" rtl="0" eaLnBrk="1" latinLnBrk="0" hangingPunct="1">
+        <a:lnSpc>
+          <a:spcPct val="90000"/>
+        </a:lnSpc>
+        <a:spcBef>
+          <a:spcPts val="300"/>
+        </a:spcBef>
+        <a:buFont typeface="Arial" panose="020B0604020202020204" pitchFamily="34" charset="0"/>
+        <a:buChar char="•"/>
+        <a:defRPr sz="1080" kern="1200">
+          <a:solidFill>
+            <a:schemeClr val="tx1"/>
+          </a:solidFill>
+          <a:latin typeface="+mn-lt"/>
+          <a:ea typeface="+mn-ea"/>
+          <a:cs typeface="+mn-cs"/>
+        </a:defRPr>
+      </a:lvl6pPr>
+      <a:lvl7pPr marL="1783080" indent="-137160" algn="l" defTabSz="548640" rtl="0" eaLnBrk="1" latinLnBrk="0" hangingPunct="1">
+        <a:lnSpc>
+          <a:spcPct val="90000"/>
+        </a:lnSpc>
+        <a:spcBef>
+          <a:spcPts val="300"/>
+        </a:spcBef>
+        <a:buFont typeface="Arial" panose="020B0604020202020204" pitchFamily="34" charset="0"/>
+        <a:buChar char="•"/>
+        <a:defRPr sz="1080" kern="1200">
+          <a:solidFill>
+            <a:schemeClr val="tx1"/>
+          </a:solidFill>
+          <a:latin typeface="+mn-lt"/>
+          <a:ea typeface="+mn-ea"/>
+          <a:cs typeface="+mn-cs"/>
+        </a:defRPr>
+      </a:lvl7pPr>
+      <a:lvl8pPr marL="2057400" indent="-137160" algn="l" defTabSz="548640" rtl="0" eaLnBrk="1" latinLnBrk="0" hangingPunct="1">
+        <a:lnSpc>
+          <a:spcPct val="90000"/>
+        </a:lnSpc>
+        <a:spcBef>
+          <a:spcPts val="300"/>
+        </a:spcBef>
+        <a:buFont typeface="Arial" panose="020B0604020202020204" pitchFamily="34" charset="0"/>
+        <a:buChar char="•"/>
+        <a:defRPr sz="1080" kern="1200">
+          <a:solidFill>
+            <a:schemeClr val="tx1"/>
+          </a:solidFill>
+          <a:latin typeface="+mn-lt"/>
+          <a:ea typeface="+mn-ea"/>
+          <a:cs typeface="+mn-cs"/>
+        </a:defRPr>
+      </a:lvl8pPr>
+      <a:lvl9pPr marL="2331720" indent="-137160" algn="l" defTabSz="548640" rtl="0" eaLnBrk="1" latinLnBrk="0" hangingPunct="1">
+        <a:lnSpc>
+          <a:spcPct val="90000"/>
+        </a:lnSpc>
+        <a:spcBef>
+          <a:spcPts val="300"/>
+        </a:spcBef>
+        <a:buFont typeface="Arial" panose="020B0604020202020204" pitchFamily="34" charset="0"/>
+        <a:buChar char="•"/>
+        <a:defRPr sz="1080" kern="1200">
+          <a:solidFill>
+            <a:schemeClr val="tx1"/>
+          </a:solidFill>
+          <a:latin typeface="+mn-lt"/>
+          <a:ea typeface="+mn-ea"/>
+          <a:cs typeface="+mn-cs"/>
+        </a:defRPr>
+      </a:lvl9pPr>
+    </p:bodyStyle>
+    <p:otherStyle>
+      <a:defPPr>
+        <a:defRPr lang="en-US"/>
+      </a:defPPr>
+      <a:lvl1pPr marL="0" algn="l" defTabSz="548640" rtl="0" eaLnBrk="1" latinLnBrk="0" hangingPunct="1">
+        <a:defRPr sz="1080" kern="1200">
+          <a:solidFill>
+            <a:schemeClr val="tx1"/>
+          </a:solidFill>
+          <a:latin typeface="+mn-lt"/>
+          <a:ea typeface="+mn-ea"/>
+          <a:cs typeface="+mn-cs"/>
+        </a:defRPr>
+      </a:lvl1pPr>
+      <a:lvl2pPr marL="274320" algn="l" defTabSz="548640" rtl="0" eaLnBrk="1" latinLnBrk="0" hangingPunct="1">
+        <a:defRPr sz="1080" kern="1200">
+          <a:solidFill>
+            <a:schemeClr val="tx1"/>
+          </a:solidFill>
+          <a:latin typeface="+mn-lt"/>
+          <a:ea typeface="+mn-ea"/>
+          <a:cs typeface="+mn-cs"/>
+        </a:defRPr>
+      </a:lvl2pPr>
+      <a:lvl3pPr marL="548640" algn="l" defTabSz="548640" rtl="0" eaLnBrk="1" latinLnBrk="0" hangingPunct="1">
+        <a:defRPr sz="1080" kern="1200">
+          <a:solidFill>
+            <a:schemeClr val="tx1"/>
+          </a:solidFill>
+          <a:latin typeface="+mn-lt"/>
+          <a:ea typeface="+mn-ea"/>
+          <a:cs typeface="+mn-cs"/>
+        </a:defRPr>
+      </a:lvl3pPr>
+      <a:lvl4pPr marL="822960" algn="l" defTabSz="548640" rtl="0" eaLnBrk="1" latinLnBrk="0" hangingPunct="1">
+        <a:defRPr sz="1080" kern="1200">
+          <a:solidFill>
+            <a:schemeClr val="tx1"/>
+          </a:solidFill>
+          <a:latin typeface="+mn-lt"/>
+          <a:ea typeface="+mn-ea"/>
+          <a:cs typeface="+mn-cs"/>
+        </a:defRPr>
+      </a:lvl4pPr>
+      <a:lvl5pPr marL="1097280" algn="l" defTabSz="548640" rtl="0" eaLnBrk="1" latinLnBrk="0" hangingPunct="1">
+        <a:defRPr sz="1080" kern="1200">
+          <a:solidFill>
+            <a:schemeClr val="tx1"/>
+          </a:solidFill>
+          <a:latin typeface="+mn-lt"/>
+          <a:ea typeface="+mn-ea"/>
+          <a:cs typeface="+mn-cs"/>
+        </a:defRPr>
+      </a:lvl5pPr>
+      <a:lvl6pPr marL="1371600" algn="l" defTabSz="548640" rtl="0" eaLnBrk="1" latinLnBrk="0" hangingPunct="1">
+        <a:defRPr sz="1080" kern="1200">
+          <a:solidFill>
+            <a:schemeClr val="tx1"/>
+          </a:solidFill>
+          <a:latin typeface="+mn-lt"/>
+          <a:ea typeface="+mn-ea"/>
+          <a:cs typeface="+mn-cs"/>
+        </a:defRPr>
+      </a:lvl6pPr>
+      <a:lvl7pPr marL="1645920" algn="l" defTabSz="548640" rtl="0" eaLnBrk="1" latinLnBrk="0" hangingPunct="1">
+        <a:defRPr sz="1080" kern="1200">
+          <a:solidFill>
+            <a:schemeClr val="tx1"/>
+          </a:solidFill>
+          <a:latin typeface="+mn-lt"/>
+          <a:ea typeface="+mn-ea"/>
+          <a:cs typeface="+mn-cs"/>
+        </a:defRPr>
+      </a:lvl7pPr>
+      <a:lvl8pPr marL="1920240" algn="l" defTabSz="548640" rtl="0" eaLnBrk="1" latinLnBrk="0" hangingPunct="1">
+        <a:defRPr sz="1080" kern="1200">
+          <a:solidFill>
+            <a:schemeClr val="tx1"/>
+          </a:solidFill>
+          <a:latin typeface="+mn-lt"/>
+          <a:ea typeface="+mn-ea"/>
+          <a:cs typeface="+mn-cs"/>
+        </a:defRPr>
+      </a:lvl8pPr>
+      <a:lvl9pPr marL="2194560" algn="l" defTabSz="548640" rtl="0" eaLnBrk="1" latinLnBrk="0" hangingPunct="1">
+        <a:defRPr sz="1080" kern="1200">
           <a:solidFill>
             <a:schemeClr val="tx1"/>
           </a:solidFill>
@@ -3469,6 +6668,234 @@
 </p:sld>
 </file>
 
+<file path=ppt/slides/slide3.xml><?xml version="1.0" encoding="utf-8"?>
+<p:sld xmlns:a="http://schemas.openxmlformats.org/drawingml/2006/main" xmlns:r="http://schemas.openxmlformats.org/officeDocument/2006/relationships" xmlns:p="http://schemas.openxmlformats.org/presentationml/2006/main">
+  <p:cSld>
+    <p:spTree>
+      <p:nvGrpSpPr>
+        <p:cNvPr id="1" name=""/>
+        <p:cNvGrpSpPr/>
+        <p:nvPr/>
+      </p:nvGrpSpPr>
+      <p:grpSpPr>
+        <a:xfrm>
+          <a:off x="0" y="0"/>
+          <a:ext cx="0" cy="0"/>
+          <a:chOff x="0" y="0"/>
+          <a:chExt cx="0" cy="0"/>
+        </a:xfrm>
+      </p:grpSpPr>
+      <p:pic>
+        <p:nvPicPr>
+          <p:cNvPr id="4" name="Picture 3">
+            <a:extLst>
+              <a:ext uri="{FF2B5EF4-FFF2-40B4-BE49-F238E27FC236}">
+                <a16:creationId xmlns:a16="http://schemas.microsoft.com/office/drawing/2014/main" id="{EB08F26D-DA82-4B56-A7B5-CA20BBA87688}"/>
+              </a:ext>
+            </a:extLst>
+          </p:cNvPr>
+          <p:cNvPicPr>
+            <a:picLocks noChangeAspect="1"/>
+          </p:cNvPicPr>
+          <p:nvPr/>
+        </p:nvPicPr>
+        <p:blipFill rotWithShape="1">
+          <a:blip r:embed="rId2"/>
+          <a:srcRect l="3264" r="21737"/>
+          <a:stretch/>
+        </p:blipFill>
+        <p:spPr>
+          <a:xfrm>
+            <a:off x="0" y="0"/>
+            <a:ext cx="7315200" cy="5486400"/>
+          </a:xfrm>
+          <a:prstGeom prst="rect">
+            <a:avLst/>
+          </a:prstGeom>
+        </p:spPr>
+      </p:pic>
+      <p:sp>
+        <p:nvSpPr>
+          <p:cNvPr id="5" name="Rectangle 4">
+            <a:extLst>
+              <a:ext uri="{FF2B5EF4-FFF2-40B4-BE49-F238E27FC236}">
+                <a16:creationId xmlns:a16="http://schemas.microsoft.com/office/drawing/2014/main" id="{3ACF8BFF-5844-48A5-B691-AD0A8E1F14F1}"/>
+              </a:ext>
+            </a:extLst>
+          </p:cNvPr>
+          <p:cNvSpPr/>
+          <p:nvPr/>
+        </p:nvSpPr>
+        <p:spPr>
+          <a:xfrm>
+            <a:off x="542730" y="917786"/>
+            <a:ext cx="6229740" cy="3650828"/>
+          </a:xfrm>
+          <a:prstGeom prst="rect">
+            <a:avLst/>
+          </a:prstGeom>
+          <a:solidFill>
+            <a:srgbClr val="000000">
+              <a:alpha val="80000"/>
+            </a:srgbClr>
+          </a:solidFill>
+          <a:ln>
+            <a:noFill/>
+          </a:ln>
+        </p:spPr>
+        <p:style>
+          <a:lnRef idx="2">
+            <a:schemeClr val="accent1">
+              <a:shade val="50000"/>
+            </a:schemeClr>
+          </a:lnRef>
+          <a:fillRef idx="1">
+            <a:schemeClr val="accent1"/>
+          </a:fillRef>
+          <a:effectRef idx="0">
+            <a:schemeClr val="accent1"/>
+          </a:effectRef>
+          <a:fontRef idx="minor">
+            <a:schemeClr val="lt1"/>
+          </a:fontRef>
+        </p:style>
+        <p:txBody>
+          <a:bodyPr rot="0" spcFirstLastPara="0" vertOverflow="overflow" horzOverflow="overflow" vert="horz" wrap="square" lIns="54864" tIns="27432" rIns="54864" bIns="27432" numCol="1" spcCol="0" rtlCol="0" fromWordArt="0" anchor="ctr" anchorCtr="0" forceAA="0" compatLnSpc="1">
+            <a:prstTxWarp prst="textNoShape">
+              <a:avLst/>
+            </a:prstTxWarp>
+            <a:noAutofit/>
+          </a:bodyPr>
+          <a:lstStyle/>
+          <a:p>
+            <a:pPr algn="ctr" defTabSz="548640"/>
+            <a:r>
+              <a:rPr lang="en-US" sz="3200" dirty="0">
+                <a:solidFill>
+                  <a:prstClr val="white"/>
+                </a:solidFill>
+                <a:latin typeface="Segoe UI" panose="020B0502040204020203" pitchFamily="34" charset="0"/>
+                <a:cs typeface="Segoe UI" panose="020B0502040204020203" pitchFamily="34" charset="0"/>
+              </a:rPr>
+              <a:t>Genetic Capitalism and Stabilizing Selection of Antimicrobial Resistance Genotypes in </a:t>
+            </a:r>
+            <a:r>
+              <a:rPr lang="en-US" sz="3200" i="1" dirty="0">
+                <a:solidFill>
+                  <a:prstClr val="white"/>
+                </a:solidFill>
+                <a:latin typeface="Segoe UI" panose="020B0502040204020203" pitchFamily="34" charset="0"/>
+                <a:cs typeface="Segoe UI" panose="020B0502040204020203" pitchFamily="34" charset="0"/>
+              </a:rPr>
+              <a:t>Escherichia coli</a:t>
+            </a:r>
+          </a:p>
+          <a:p>
+            <a:pPr algn="ctr" defTabSz="548640"/>
+            <a:endParaRPr lang="en-US" sz="3200" i="1" dirty="0">
+              <a:solidFill>
+                <a:prstClr val="white"/>
+              </a:solidFill>
+              <a:latin typeface="Segoe UI" panose="020B0502040204020203" pitchFamily="34" charset="0"/>
+              <a:cs typeface="Segoe UI" panose="020B0502040204020203" pitchFamily="34" charset="0"/>
+            </a:endParaRPr>
+          </a:p>
+          <a:p>
+            <a:pPr algn="ctr" defTabSz="548640"/>
+            <a:r>
+              <a:rPr lang="en-US" dirty="0">
+                <a:solidFill>
+                  <a:srgbClr val="ED7D31">
+                    <a:lumMod val="60000"/>
+                    <a:lumOff val="40000"/>
+                  </a:srgbClr>
+                </a:solidFill>
+                <a:latin typeface="Segoe UI" panose="020B0502040204020203" pitchFamily="34" charset="0"/>
+                <a:cs typeface="Segoe UI" panose="020B0502040204020203" pitchFamily="34" charset="0"/>
+              </a:rPr>
+              <a:t>Colby T. Ford, Gabriel Lopez </a:t>
+            </a:r>
+            <a:r>
+              <a:rPr lang="en-US" dirty="0" err="1">
+                <a:solidFill>
+                  <a:srgbClr val="ED7D31">
+                    <a:lumMod val="60000"/>
+                    <a:lumOff val="40000"/>
+                  </a:srgbClr>
+                </a:solidFill>
+                <a:latin typeface="Segoe UI" panose="020B0502040204020203" pitchFamily="34" charset="0"/>
+                <a:cs typeface="Segoe UI" panose="020B0502040204020203" pitchFamily="34" charset="0"/>
+              </a:rPr>
+              <a:t>Zenarosa</a:t>
+            </a:r>
+            <a:r>
+              <a:rPr lang="en-US" dirty="0">
+                <a:solidFill>
+                  <a:srgbClr val="ED7D31">
+                    <a:lumMod val="60000"/>
+                    <a:lumOff val="40000"/>
+                  </a:srgbClr>
+                </a:solidFill>
+                <a:latin typeface="Segoe UI" panose="020B0502040204020203" pitchFamily="34" charset="0"/>
+                <a:cs typeface="Segoe UI" panose="020B0502040204020203" pitchFamily="34" charset="0"/>
+              </a:rPr>
+              <a:t>, Kevin Smith,</a:t>
+            </a:r>
+          </a:p>
+          <a:p>
+            <a:pPr algn="ctr" defTabSz="548640"/>
+            <a:r>
+              <a:rPr lang="en-US" dirty="0">
+                <a:solidFill>
+                  <a:srgbClr val="ED7D31">
+                    <a:lumMod val="60000"/>
+                    <a:lumOff val="40000"/>
+                  </a:srgbClr>
+                </a:solidFill>
+                <a:latin typeface="Segoe UI" panose="020B0502040204020203" pitchFamily="34" charset="0"/>
+                <a:cs typeface="Segoe UI" panose="020B0502040204020203" pitchFamily="34" charset="0"/>
+              </a:rPr>
+              <a:t>David Brown, John Williams, and Daniel </a:t>
+            </a:r>
+            <a:r>
+              <a:rPr lang="en-US" dirty="0" err="1">
+                <a:solidFill>
+                  <a:srgbClr val="ED7D31">
+                    <a:lumMod val="60000"/>
+                    <a:lumOff val="40000"/>
+                  </a:srgbClr>
+                </a:solidFill>
+                <a:latin typeface="Segoe UI" panose="020B0502040204020203" pitchFamily="34" charset="0"/>
+                <a:cs typeface="Segoe UI" panose="020B0502040204020203" pitchFamily="34" charset="0"/>
+              </a:rPr>
+              <a:t>Janies</a:t>
+            </a:r>
+            <a:endParaRPr lang="en-US" dirty="0">
+              <a:solidFill>
+                <a:srgbClr val="ED7D31">
+                  <a:lumMod val="60000"/>
+                  <a:lumOff val="40000"/>
+                </a:srgbClr>
+              </a:solidFill>
+              <a:latin typeface="Segoe UI" panose="020B0502040204020203" pitchFamily="34" charset="0"/>
+              <a:cs typeface="Segoe UI" panose="020B0502040204020203" pitchFamily="34" charset="0"/>
+            </a:endParaRPr>
+          </a:p>
+        </p:txBody>
+      </p:sp>
+    </p:spTree>
+    <p:extLst>
+      <p:ext uri="{BB962C8B-B14F-4D97-AF65-F5344CB8AC3E}">
+        <p14:creationId xmlns:p14="http://schemas.microsoft.com/office/powerpoint/2010/main" val="1820058244"/>
+      </p:ext>
+    </p:extLst>
+  </p:cSld>
+  <p:clrMapOvr>
+    <a:masterClrMapping/>
+  </p:clrMapOvr>
+</p:sld>
+</file>
+
 <file path=ppt/theme/theme1.xml><?xml version="1.0" encoding="utf-8"?>
 <a:theme xmlns:a="http://schemas.openxmlformats.org/drawingml/2006/main" name="Office Theme">
   <a:themeElements>
@@ -3728,4 +7155,299 @@
     </a:ext>
   </a:extLst>
 </a:theme>
+</file>
+
+<file path=ppt/theme/theme2.xml><?xml version="1.0" encoding="utf-8"?>
+<a:theme xmlns:a="http://schemas.openxmlformats.org/drawingml/2006/main" name="1_Office Theme">
+  <a:themeElements>
+    <a:clrScheme name="Office">
+      <a:dk1>
+        <a:sysClr val="windowText" lastClr="000000"/>
+      </a:dk1>
+      <a:lt1>
+        <a:sysClr val="window" lastClr="FFFFFF"/>
+      </a:lt1>
+      <a:dk2>
+        <a:srgbClr val="44546A"/>
+      </a:dk2>
+      <a:lt2>
+        <a:srgbClr val="E7E6E6"/>
+      </a:lt2>
+      <a:accent1>
+        <a:srgbClr val="4472C4"/>
+      </a:accent1>
+      <a:accent2>
+        <a:srgbClr val="ED7D31"/>
+      </a:accent2>
+      <a:accent3>
+        <a:srgbClr val="A5A5A5"/>
+      </a:accent3>
+      <a:accent4>
+        <a:srgbClr val="FFC000"/>
+      </a:accent4>
+      <a:accent5>
+        <a:srgbClr val="5B9BD5"/>
+      </a:accent5>
+      <a:accent6>
+        <a:srgbClr val="70AD47"/>
+      </a:accent6>
+      <a:hlink>
+        <a:srgbClr val="0563C1"/>
+      </a:hlink>
+      <a:folHlink>
+        <a:srgbClr val="954F72"/>
+      </a:folHlink>
+    </a:clrScheme>
+    <a:fontScheme name="Office">
+      <a:majorFont>
+        <a:latin typeface="Calibri Light" panose="020F0302020204030204"/>
+        <a:ea typeface=""/>
+        <a:cs typeface=""/>
+        <a:font script="Jpan" typeface="游ゴシック Light"/>
+        <a:font script="Hang" typeface="맑은 고딕"/>
+        <a:font script="Hans" typeface="等线 Light"/>
+        <a:font script="Hant" typeface="新細明體"/>
+        <a:font script="Arab" typeface="Times New Roman"/>
+        <a:font script="Hebr" typeface="Times New Roman"/>
+        <a:font script="Thai" typeface="Angsana New"/>
+        <a:font script="Ethi" typeface="Nyala"/>
+        <a:font script="Beng" typeface="Vrinda"/>
+        <a:font script="Gujr" typeface="Shruti"/>
+        <a:font script="Khmr" typeface="MoolBoran"/>
+        <a:font script="Knda" typeface="Tunga"/>
+        <a:font script="Guru" typeface="Raavi"/>
+        <a:font script="Cans" typeface="Euphemia"/>
+        <a:font script="Cher" typeface="Plantagenet Cherokee"/>
+        <a:font script="Yiii" typeface="Microsoft Yi Baiti"/>
+        <a:font script="Tibt" typeface="Microsoft Himalaya"/>
+        <a:font script="Thaa" typeface="MV Boli"/>
+        <a:font script="Deva" typeface="Mangal"/>
+        <a:font script="Telu" typeface="Gautami"/>
+        <a:font script="Taml" typeface="Latha"/>
+        <a:font script="Syrc" typeface="Estrangelo Edessa"/>
+        <a:font script="Orya" typeface="Kalinga"/>
+        <a:font script="Mlym" typeface="Kartika"/>
+        <a:font script="Laoo" typeface="DokChampa"/>
+        <a:font script="Sinh" typeface="Iskoola Pota"/>
+        <a:font script="Mong" typeface="Mongolian Baiti"/>
+        <a:font script="Viet" typeface="Times New Roman"/>
+        <a:font script="Uigh" typeface="Microsoft Uighur"/>
+        <a:font script="Geor" typeface="Sylfaen"/>
+        <a:font script="Armn" typeface="Arial"/>
+        <a:font script="Bugi" typeface="Leelawadee UI"/>
+        <a:font script="Bopo" typeface="Microsoft JhengHei"/>
+        <a:font script="Java" typeface="Javanese Text"/>
+        <a:font script="Lisu" typeface="Segoe UI"/>
+        <a:font script="Mymr" typeface="Myanmar Text"/>
+        <a:font script="Nkoo" typeface="Ebrima"/>
+        <a:font script="Olck" typeface="Nirmala UI"/>
+        <a:font script="Osma" typeface="Ebrima"/>
+        <a:font script="Phag" typeface="Phagspa"/>
+        <a:font script="Syrn" typeface="Estrangelo Edessa"/>
+        <a:font script="Syrj" typeface="Estrangelo Edessa"/>
+        <a:font script="Syre" typeface="Estrangelo Edessa"/>
+        <a:font script="Sora" typeface="Nirmala UI"/>
+        <a:font script="Tale" typeface="Microsoft Tai Le"/>
+        <a:font script="Talu" typeface="Microsoft New Tai Lue"/>
+        <a:font script="Tfng" typeface="Ebrima"/>
+      </a:majorFont>
+      <a:minorFont>
+        <a:latin typeface="Calibri" panose="020F0502020204030204"/>
+        <a:ea typeface=""/>
+        <a:cs typeface=""/>
+        <a:font script="Jpan" typeface="游ゴシック"/>
+        <a:font script="Hang" typeface="맑은 고딕"/>
+        <a:font script="Hans" typeface="等线"/>
+        <a:font script="Hant" typeface="新細明體"/>
+        <a:font script="Arab" typeface="Arial"/>
+        <a:font script="Hebr" typeface="Arial"/>
+        <a:font script="Thai" typeface="Cordia New"/>
+        <a:font script="Ethi" typeface="Nyala"/>
+        <a:font script="Beng" typeface="Vrinda"/>
+        <a:font script="Gujr" typeface="Shruti"/>
+        <a:font script="Khmr" typeface="DaunPenh"/>
+        <a:font script="Knda" typeface="Tunga"/>
+        <a:font script="Guru" typeface="Raavi"/>
+        <a:font script="Cans" typeface="Euphemia"/>
+        <a:font script="Cher" typeface="Plantagenet Cherokee"/>
+        <a:font script="Yiii" typeface="Microsoft Yi Baiti"/>
+        <a:font script="Tibt" typeface="Microsoft Himalaya"/>
+        <a:font script="Thaa" typeface="MV Boli"/>
+        <a:font script="Deva" typeface="Mangal"/>
+        <a:font script="Telu" typeface="Gautami"/>
+        <a:font script="Taml" typeface="Latha"/>
+        <a:font script="Syrc" typeface="Estrangelo Edessa"/>
+        <a:font script="Orya" typeface="Kalinga"/>
+        <a:font script="Mlym" typeface="Kartika"/>
+        <a:font script="Laoo" typeface="DokChampa"/>
+        <a:font script="Sinh" typeface="Iskoola Pota"/>
+        <a:font script="Mong" typeface="Mongolian Baiti"/>
+        <a:font script="Viet" typeface="Arial"/>
+        <a:font script="Uigh" typeface="Microsoft Uighur"/>
+        <a:font script="Geor" typeface="Sylfaen"/>
+        <a:font script="Armn" typeface="Arial"/>
+        <a:font script="Bugi" typeface="Leelawadee UI"/>
+        <a:font script="Bopo" typeface="Microsoft JhengHei"/>
+        <a:font script="Java" typeface="Javanese Text"/>
+        <a:font script="Lisu" typeface="Segoe UI"/>
+        <a:font script="Mymr" typeface="Myanmar Text"/>
+        <a:font script="Nkoo" typeface="Ebrima"/>
+        <a:font script="Olck" typeface="Nirmala UI"/>
+        <a:font script="Osma" typeface="Ebrima"/>
+        <a:font script="Phag" typeface="Phagspa"/>
+        <a:font script="Syrn" typeface="Estrangelo Edessa"/>
+        <a:font script="Syrj" typeface="Estrangelo Edessa"/>
+        <a:font script="Syre" typeface="Estrangelo Edessa"/>
+        <a:font script="Sora" typeface="Nirmala UI"/>
+        <a:font script="Tale" typeface="Microsoft Tai Le"/>
+        <a:font script="Talu" typeface="Microsoft New Tai Lue"/>
+        <a:font script="Tfng" typeface="Ebrima"/>
+      </a:minorFont>
+    </a:fontScheme>
+    <a:fmtScheme name="Office">
+      <a:fillStyleLst>
+        <a:solidFill>
+          <a:schemeClr val="phClr"/>
+        </a:solidFill>
+        <a:gradFill rotWithShape="1">
+          <a:gsLst>
+            <a:gs pos="0">
+              <a:schemeClr val="phClr">
+                <a:lumMod val="110000"/>
+                <a:satMod val="105000"/>
+                <a:tint val="67000"/>
+              </a:schemeClr>
+            </a:gs>
+            <a:gs pos="50000">
+              <a:schemeClr val="phClr">
+                <a:lumMod val="105000"/>
+                <a:satMod val="103000"/>
+                <a:tint val="73000"/>
+              </a:schemeClr>
+            </a:gs>
+            <a:gs pos="100000">
+              <a:schemeClr val="phClr">
+                <a:lumMod val="105000"/>
+                <a:satMod val="109000"/>
+                <a:tint val="81000"/>
+              </a:schemeClr>
+            </a:gs>
+          </a:gsLst>
+          <a:lin ang="5400000" scaled="0"/>
+        </a:gradFill>
+        <a:gradFill rotWithShape="1">
+          <a:gsLst>
+            <a:gs pos="0">
+              <a:schemeClr val="phClr">
+                <a:satMod val="103000"/>
+                <a:lumMod val="102000"/>
+                <a:tint val="94000"/>
+              </a:schemeClr>
+            </a:gs>
+            <a:gs pos="50000">
+              <a:schemeClr val="phClr">
+                <a:satMod val="110000"/>
+                <a:lumMod val="100000"/>
+                <a:shade val="100000"/>
+              </a:schemeClr>
+            </a:gs>
+            <a:gs pos="100000">
+              <a:schemeClr val="phClr">
+                <a:lumMod val="99000"/>
+                <a:satMod val="120000"/>
+                <a:shade val="78000"/>
+              </a:schemeClr>
+            </a:gs>
+          </a:gsLst>
+          <a:lin ang="5400000" scaled="0"/>
+        </a:gradFill>
+      </a:fillStyleLst>
+      <a:lnStyleLst>
+        <a:ln w="6350" cap="flat" cmpd="sng" algn="ctr">
+          <a:solidFill>
+            <a:schemeClr val="phClr"/>
+          </a:solidFill>
+          <a:prstDash val="solid"/>
+          <a:miter lim="800000"/>
+        </a:ln>
+        <a:ln w="12700" cap="flat" cmpd="sng" algn="ctr">
+          <a:solidFill>
+            <a:schemeClr val="phClr"/>
+          </a:solidFill>
+          <a:prstDash val="solid"/>
+          <a:miter lim="800000"/>
+        </a:ln>
+        <a:ln w="19050" cap="flat" cmpd="sng" algn="ctr">
+          <a:solidFill>
+            <a:schemeClr val="phClr"/>
+          </a:solidFill>
+          <a:prstDash val="solid"/>
+          <a:miter lim="800000"/>
+        </a:ln>
+      </a:lnStyleLst>
+      <a:effectStyleLst>
+        <a:effectStyle>
+          <a:effectLst/>
+        </a:effectStyle>
+        <a:effectStyle>
+          <a:effectLst/>
+        </a:effectStyle>
+        <a:effectStyle>
+          <a:effectLst>
+            <a:outerShdw blurRad="57150" dist="19050" dir="5400000" algn="ctr" rotWithShape="0">
+              <a:srgbClr val="000000">
+                <a:alpha val="63000"/>
+              </a:srgbClr>
+            </a:outerShdw>
+          </a:effectLst>
+        </a:effectStyle>
+      </a:effectStyleLst>
+      <a:bgFillStyleLst>
+        <a:solidFill>
+          <a:schemeClr val="phClr"/>
+        </a:solidFill>
+        <a:solidFill>
+          <a:schemeClr val="phClr">
+            <a:tint val="95000"/>
+            <a:satMod val="170000"/>
+          </a:schemeClr>
+        </a:solidFill>
+        <a:gradFill rotWithShape="1">
+          <a:gsLst>
+            <a:gs pos="0">
+              <a:schemeClr val="phClr">
+                <a:tint val="93000"/>
+                <a:satMod val="150000"/>
+                <a:shade val="98000"/>
+                <a:lumMod val="102000"/>
+              </a:schemeClr>
+            </a:gs>
+            <a:gs pos="50000">
+              <a:schemeClr val="phClr">
+                <a:tint val="98000"/>
+                <a:satMod val="130000"/>
+                <a:shade val="90000"/>
+                <a:lumMod val="103000"/>
+              </a:schemeClr>
+            </a:gs>
+            <a:gs pos="100000">
+              <a:schemeClr val="phClr">
+                <a:shade val="63000"/>
+                <a:satMod val="120000"/>
+              </a:schemeClr>
+            </a:gs>
+          </a:gsLst>
+          <a:lin ang="5400000" scaled="0"/>
+        </a:gradFill>
+      </a:bgFillStyleLst>
+    </a:fmtScheme>
+  </a:themeElements>
+  <a:objectDefaults/>
+  <a:extraClrSchemeLst/>
+  <a:extLst>
+    <a:ext uri="{05A4C25C-085E-4340-85A3-A5531E510DB2}">
+      <thm15:themeFamily xmlns:thm15="http://schemas.microsoft.com/office/thememl/2012/main" name="Office Theme" id="{62F939B6-93AF-4DB8-9C6B-D6C7DFDC589F}" vid="{4A3C46E8-61CC-4603-A589-7422A47A8E4A}"/>
+    </a:ext>
+  </a:extLst>
+</a:theme>
 </file>
</xml_diff>

<commit_message>
Add PfHRP2 ML paper
</commit_message>
<xml_diff>
--- a/research/img/research_headers.pptx
+++ b/research/img/research_headers.pptx
@@ -7,8 +7,9 @@
   </p:sldMasterIdLst>
   <p:sldIdLst>
     <p:sldId id="256" r:id="rId3"/>
-    <p:sldId id="257" r:id="rId4"/>
-    <p:sldId id="259" r:id="rId5"/>
+    <p:sldId id="260" r:id="rId4"/>
+    <p:sldId id="257" r:id="rId5"/>
+    <p:sldId id="259" r:id="rId6"/>
   </p:sldIdLst>
   <p:sldSz cx="7315200" cy="5486400" type="B5JIS"/>
   <p:notesSz cx="6858000" cy="9144000"/>
@@ -246,7 +247,7 @@
           <a:p>
             <a:fld id="{DF9B7973-EE54-40B6-814D-4B97DB32E5B3}" type="datetimeFigureOut">
               <a:rPr lang="en-US" smtClean="0"/>
-              <a:t>1/14/2020</a:t>
+              <a:t>12/28/2020</a:t>
             </a:fld>
             <a:endParaRPr lang="en-US"/>
           </a:p>
@@ -416,7 +417,7 @@
           <a:p>
             <a:fld id="{DF9B7973-EE54-40B6-814D-4B97DB32E5B3}" type="datetimeFigureOut">
               <a:rPr lang="en-US" smtClean="0"/>
-              <a:t>1/14/2020</a:t>
+              <a:t>12/28/2020</a:t>
             </a:fld>
             <a:endParaRPr lang="en-US"/>
           </a:p>
@@ -596,7 +597,7 @@
           <a:p>
             <a:fld id="{DF9B7973-EE54-40B6-814D-4B97DB32E5B3}" type="datetimeFigureOut">
               <a:rPr lang="en-US" smtClean="0"/>
-              <a:t>1/14/2020</a:t>
+              <a:t>12/28/2020</a:t>
             </a:fld>
             <a:endParaRPr lang="en-US"/>
           </a:p>
@@ -804,7 +805,7 @@
           <a:p>
             <a:fld id="{D793FBF9-7FD6-43C2-8557-8F5C9FBE75EA}" type="datetimeFigureOut">
               <a:rPr lang="en-US" smtClean="0"/>
-              <a:t>1/14/2020</a:t>
+              <a:t>12/28/2020</a:t>
             </a:fld>
             <a:endParaRPr lang="en-US"/>
           </a:p>
@@ -1002,7 +1003,7 @@
           <a:p>
             <a:fld id="{D793FBF9-7FD6-43C2-8557-8F5C9FBE75EA}" type="datetimeFigureOut">
               <a:rPr lang="en-US" smtClean="0"/>
-              <a:t>1/14/2020</a:t>
+              <a:t>12/28/2020</a:t>
             </a:fld>
             <a:endParaRPr lang="en-US"/>
           </a:p>
@@ -1277,7 +1278,7 @@
           <a:p>
             <a:fld id="{D793FBF9-7FD6-43C2-8557-8F5C9FBE75EA}" type="datetimeFigureOut">
               <a:rPr lang="en-US" smtClean="0"/>
-              <a:t>1/14/2020</a:t>
+              <a:t>12/28/2020</a:t>
             </a:fld>
             <a:endParaRPr lang="en-US"/>
           </a:p>
@@ -1542,7 +1543,7 @@
           <a:p>
             <a:fld id="{D793FBF9-7FD6-43C2-8557-8F5C9FBE75EA}" type="datetimeFigureOut">
               <a:rPr lang="en-US" smtClean="0"/>
-              <a:t>1/14/2020</a:t>
+              <a:t>12/28/2020</a:t>
             </a:fld>
             <a:endParaRPr lang="en-US"/>
           </a:p>
@@ -1954,7 +1955,7 @@
           <a:p>
             <a:fld id="{D793FBF9-7FD6-43C2-8557-8F5C9FBE75EA}" type="datetimeFigureOut">
               <a:rPr lang="en-US" smtClean="0"/>
-              <a:t>1/14/2020</a:t>
+              <a:t>12/28/2020</a:t>
             </a:fld>
             <a:endParaRPr lang="en-US"/>
           </a:p>
@@ -2095,7 +2096,7 @@
           <a:p>
             <a:fld id="{D793FBF9-7FD6-43C2-8557-8F5C9FBE75EA}" type="datetimeFigureOut">
               <a:rPr lang="en-US" smtClean="0"/>
-              <a:t>1/14/2020</a:t>
+              <a:t>12/28/2020</a:t>
             </a:fld>
             <a:endParaRPr lang="en-US"/>
           </a:p>
@@ -2208,7 +2209,7 @@
           <a:p>
             <a:fld id="{D793FBF9-7FD6-43C2-8557-8F5C9FBE75EA}" type="datetimeFigureOut">
               <a:rPr lang="en-US" smtClean="0"/>
-              <a:t>1/14/2020</a:t>
+              <a:t>12/28/2020</a:t>
             </a:fld>
             <a:endParaRPr lang="en-US"/>
           </a:p>
@@ -2519,7 +2520,7 @@
           <a:p>
             <a:fld id="{D793FBF9-7FD6-43C2-8557-8F5C9FBE75EA}" type="datetimeFigureOut">
               <a:rPr lang="en-US" smtClean="0"/>
-              <a:t>1/14/2020</a:t>
+              <a:t>12/28/2020</a:t>
             </a:fld>
             <a:endParaRPr lang="en-US"/>
           </a:p>
@@ -2701,7 +2702,7 @@
           <a:p>
             <a:fld id="{DF9B7973-EE54-40B6-814D-4B97DB32E5B3}" type="datetimeFigureOut">
               <a:rPr lang="en-US" smtClean="0"/>
-              <a:t>1/14/2020</a:t>
+              <a:t>12/28/2020</a:t>
             </a:fld>
             <a:endParaRPr lang="en-US"/>
           </a:p>
@@ -2977,7 +2978,7 @@
           <a:p>
             <a:fld id="{D793FBF9-7FD6-43C2-8557-8F5C9FBE75EA}" type="datetimeFigureOut">
               <a:rPr lang="en-US" smtClean="0"/>
-              <a:t>1/14/2020</a:t>
+              <a:t>12/28/2020</a:t>
             </a:fld>
             <a:endParaRPr lang="en-US"/>
           </a:p>
@@ -3175,7 +3176,7 @@
           <a:p>
             <a:fld id="{D793FBF9-7FD6-43C2-8557-8F5C9FBE75EA}" type="datetimeFigureOut">
               <a:rPr lang="en-US" smtClean="0"/>
-              <a:t>1/14/2020</a:t>
+              <a:t>12/28/2020</a:t>
             </a:fld>
             <a:endParaRPr lang="en-US"/>
           </a:p>
@@ -3383,7 +3384,7 @@
           <a:p>
             <a:fld id="{D793FBF9-7FD6-43C2-8557-8F5C9FBE75EA}" type="datetimeFigureOut">
               <a:rPr lang="en-US" smtClean="0"/>
-              <a:t>1/14/2020</a:t>
+              <a:t>12/28/2020</a:t>
             </a:fld>
             <a:endParaRPr lang="en-US"/>
           </a:p>
@@ -3639,7 +3640,7 @@
           <a:p>
             <a:fld id="{DF9B7973-EE54-40B6-814D-4B97DB32E5B3}" type="datetimeFigureOut">
               <a:rPr lang="en-US" smtClean="0"/>
-              <a:t>1/14/2020</a:t>
+              <a:t>12/28/2020</a:t>
             </a:fld>
             <a:endParaRPr lang="en-US"/>
           </a:p>
@@ -3871,7 +3872,7 @@
           <a:p>
             <a:fld id="{DF9B7973-EE54-40B6-814D-4B97DB32E5B3}" type="datetimeFigureOut">
               <a:rPr lang="en-US" smtClean="0"/>
-              <a:t>1/14/2020</a:t>
+              <a:t>12/28/2020</a:t>
             </a:fld>
             <a:endParaRPr lang="en-US"/>
           </a:p>
@@ -4238,7 +4239,7 @@
           <a:p>
             <a:fld id="{DF9B7973-EE54-40B6-814D-4B97DB32E5B3}" type="datetimeFigureOut">
               <a:rPr lang="en-US" smtClean="0"/>
-              <a:t>1/14/2020</a:t>
+              <a:t>12/28/2020</a:t>
             </a:fld>
             <a:endParaRPr lang="en-US"/>
           </a:p>
@@ -4356,7 +4357,7 @@
           <a:p>
             <a:fld id="{DF9B7973-EE54-40B6-814D-4B97DB32E5B3}" type="datetimeFigureOut">
               <a:rPr lang="en-US" smtClean="0"/>
-              <a:t>1/14/2020</a:t>
+              <a:t>12/28/2020</a:t>
             </a:fld>
             <a:endParaRPr lang="en-US"/>
           </a:p>
@@ -4451,7 +4452,7 @@
           <a:p>
             <a:fld id="{DF9B7973-EE54-40B6-814D-4B97DB32E5B3}" type="datetimeFigureOut">
               <a:rPr lang="en-US" smtClean="0"/>
-              <a:t>1/14/2020</a:t>
+              <a:t>12/28/2020</a:t>
             </a:fld>
             <a:endParaRPr lang="en-US"/>
           </a:p>
@@ -4728,7 +4729,7 @@
           <a:p>
             <a:fld id="{DF9B7973-EE54-40B6-814D-4B97DB32E5B3}" type="datetimeFigureOut">
               <a:rPr lang="en-US" smtClean="0"/>
-              <a:t>1/14/2020</a:t>
+              <a:t>12/28/2020</a:t>
             </a:fld>
             <a:endParaRPr lang="en-US"/>
           </a:p>
@@ -4985,7 +4986,7 @@
           <a:p>
             <a:fld id="{DF9B7973-EE54-40B6-814D-4B97DB32E5B3}" type="datetimeFigureOut">
               <a:rPr lang="en-US" smtClean="0"/>
-              <a:t>1/14/2020</a:t>
+              <a:t>12/28/2020</a:t>
             </a:fld>
             <a:endParaRPr lang="en-US"/>
           </a:p>
@@ -5198,7 +5199,7 @@
           <a:p>
             <a:fld id="{DF9B7973-EE54-40B6-814D-4B97DB32E5B3}" type="datetimeFigureOut">
               <a:rPr lang="en-US" smtClean="0"/>
-              <a:t>1/14/2020</a:t>
+              <a:t>12/28/2020</a:t>
             </a:fld>
             <a:endParaRPr lang="en-US"/>
           </a:p>
@@ -5754,7 +5755,7 @@
           <a:p>
             <a:fld id="{D793FBF9-7FD6-43C2-8557-8F5C9FBE75EA}" type="datetimeFigureOut">
               <a:rPr lang="en-US" smtClean="0"/>
-              <a:t>1/14/2020</a:t>
+              <a:t>12/28/2020</a:t>
             </a:fld>
             <a:endParaRPr lang="en-US"/>
           </a:p>
@@ -6548,6 +6549,340 @@
       </p:grpSpPr>
       <p:grpSp>
         <p:nvGrpSpPr>
+          <p:cNvPr id="23" name="Group 22">
+            <a:extLst>
+              <a:ext uri="{FF2B5EF4-FFF2-40B4-BE49-F238E27FC236}">
+                <a16:creationId xmlns:a16="http://schemas.microsoft.com/office/drawing/2014/main" id="{6CBAEB40-D5DC-4473-A1B7-A33240A642B7}"/>
+              </a:ext>
+            </a:extLst>
+          </p:cNvPr>
+          <p:cNvGrpSpPr/>
+          <p:nvPr/>
+        </p:nvGrpSpPr>
+        <p:grpSpPr>
+          <a:xfrm>
+            <a:off x="0" y="0"/>
+            <a:ext cx="7315200" cy="5486400"/>
+            <a:chOff x="0" y="0"/>
+            <a:chExt cx="7315200" cy="5486400"/>
+          </a:xfrm>
+        </p:grpSpPr>
+        <p:sp>
+          <p:nvSpPr>
+            <p:cNvPr id="22" name="Rectangle 21">
+              <a:extLst>
+                <a:ext uri="{FF2B5EF4-FFF2-40B4-BE49-F238E27FC236}">
+                  <a16:creationId xmlns:a16="http://schemas.microsoft.com/office/drawing/2014/main" id="{39CAA1AE-28DD-4F96-AEAF-1A52C6104900}"/>
+                </a:ext>
+              </a:extLst>
+            </p:cNvPr>
+            <p:cNvSpPr/>
+            <p:nvPr/>
+          </p:nvSpPr>
+          <p:spPr>
+            <a:xfrm>
+              <a:off x="0" y="3982720"/>
+              <a:ext cx="7315200" cy="1503680"/>
+            </a:xfrm>
+            <a:prstGeom prst="rect">
+              <a:avLst/>
+            </a:prstGeom>
+            <a:solidFill>
+              <a:schemeClr val="bg1"/>
+            </a:solidFill>
+          </p:spPr>
+          <p:style>
+            <a:lnRef idx="2">
+              <a:schemeClr val="accent1">
+                <a:shade val="50000"/>
+              </a:schemeClr>
+            </a:lnRef>
+            <a:fillRef idx="1">
+              <a:schemeClr val="accent1"/>
+            </a:fillRef>
+            <a:effectRef idx="0">
+              <a:schemeClr val="accent1"/>
+            </a:effectRef>
+            <a:fontRef idx="minor">
+              <a:schemeClr val="lt1"/>
+            </a:fontRef>
+          </p:style>
+          <p:txBody>
+            <a:bodyPr rtlCol="0" anchor="ctr"/>
+            <a:lstStyle/>
+            <a:p>
+              <a:pPr algn="ctr"/>
+              <a:endParaRPr lang="en-US"/>
+            </a:p>
+          </p:txBody>
+        </p:sp>
+        <p:sp>
+          <p:nvSpPr>
+            <p:cNvPr id="17" name="Rectangle 16">
+              <a:extLst>
+                <a:ext uri="{FF2B5EF4-FFF2-40B4-BE49-F238E27FC236}">
+                  <a16:creationId xmlns:a16="http://schemas.microsoft.com/office/drawing/2014/main" id="{95A78EC4-6871-4A26-8F8A-46658585BAB1}"/>
+                </a:ext>
+              </a:extLst>
+            </p:cNvPr>
+            <p:cNvSpPr/>
+            <p:nvPr/>
+          </p:nvSpPr>
+          <p:spPr>
+            <a:xfrm>
+              <a:off x="0" y="0"/>
+              <a:ext cx="7315200" cy="3982720"/>
+            </a:xfrm>
+            <a:prstGeom prst="rect">
+              <a:avLst/>
+            </a:prstGeom>
+            <a:solidFill>
+              <a:srgbClr val="810A10"/>
+            </a:solidFill>
+            <a:ln>
+              <a:noFill/>
+            </a:ln>
+          </p:spPr>
+          <p:style>
+            <a:lnRef idx="2">
+              <a:schemeClr val="accent1">
+                <a:shade val="50000"/>
+              </a:schemeClr>
+            </a:lnRef>
+            <a:fillRef idx="1">
+              <a:schemeClr val="accent1"/>
+            </a:fillRef>
+            <a:effectRef idx="0">
+              <a:schemeClr val="accent1"/>
+            </a:effectRef>
+            <a:fontRef idx="minor">
+              <a:schemeClr val="lt1"/>
+            </a:fontRef>
+          </p:style>
+          <p:txBody>
+            <a:bodyPr rtlCol="0" anchor="ctr"/>
+            <a:lstStyle/>
+            <a:p>
+              <a:pPr algn="ctr"/>
+              <a:endParaRPr lang="en-US" dirty="0"/>
+            </a:p>
+          </p:txBody>
+        </p:sp>
+        <p:pic>
+          <p:nvPicPr>
+            <p:cNvPr id="15" name="Picture 14" descr="A screenshot of a cell phone&#10;&#10;Description automatically generated">
+              <a:extLst>
+                <a:ext uri="{FF2B5EF4-FFF2-40B4-BE49-F238E27FC236}">
+                  <a16:creationId xmlns:a16="http://schemas.microsoft.com/office/drawing/2014/main" id="{8A4A1F69-1BB1-4E98-98D0-9B8E945B5FB4}"/>
+                </a:ext>
+              </a:extLst>
+            </p:cNvPr>
+            <p:cNvPicPr>
+              <a:picLocks noChangeAspect="1"/>
+            </p:cNvPicPr>
+            <p:nvPr/>
+          </p:nvPicPr>
+          <p:blipFill rotWithShape="1">
+            <a:blip r:embed="rId2">
+              <a:clrChange>
+                <a:clrFrom>
+                  <a:srgbClr val="820A10"/>
+                </a:clrFrom>
+                <a:clrTo>
+                  <a:srgbClr val="820A10">
+                    <a:alpha val="0"/>
+                  </a:srgbClr>
+                </a:clrTo>
+              </a:clrChange>
+              <a:extLst>
+                <a:ext uri="{BEBA8EAE-BF5A-486C-A8C5-ECC9F3942E4B}">
+                  <a14:imgProps xmlns:a14="http://schemas.microsoft.com/office/drawing/2010/main">
+                    <a14:imgLayer r:embed="rId3">
+                      <a14:imgEffect>
+                        <a14:backgroundRemoval t="8800" b="90000" l="2055" r="21832">
+                          <a14:foregroundMark x1="12757" y1="9200" x2="15582" y2="8800"/>
+                          <a14:foregroundMark x1="14983" y1="42400" x2="15325" y2="49200"/>
+                          <a14:foregroundMark x1="14640" y1="36800" x2="15497" y2="36800"/>
+                          <a14:foregroundMark x1="14812" y1="56000" x2="19521" y2="74800"/>
+                          <a14:foregroundMark x1="19521" y1="74800" x2="19863" y2="60800"/>
+                          <a14:foregroundMark x1="19863" y1="60800" x2="18836" y2="47600"/>
+                          <a14:foregroundMark x1="18836" y1="47600" x2="18921" y2="44800"/>
+                          <a14:foregroundMark x1="20548" y1="75600" x2="17466" y2="82400"/>
+                          <a14:foregroundMark x1="17466" y1="82400" x2="10959" y2="74400"/>
+                          <a14:foregroundMark x1="10959" y1="74400" x2="10788" y2="74400"/>
+                          <a14:foregroundMark x1="13014" y1="60800" x2="9846" y2="63200"/>
+                          <a14:foregroundMark x1="9846" y1="63200" x2="7106" y2="80000"/>
+                          <a14:foregroundMark x1="17380" y1="47600" x2="19521" y2="47200"/>
+                          <a14:foregroundMark x1="15925" y1="52400" x2="16010" y2="55600"/>
+                          <a14:foregroundMark x1="15068" y1="54400" x2="14640" y2="53200"/>
+                          <a14:foregroundMark x1="14384" y1="54400" x2="14298" y2="53600"/>
+                          <a14:foregroundMark x1="20890" y1="72800" x2="19863" y2="84000"/>
+                          <a14:foregroundMark x1="21404" y1="74800" x2="21832" y2="78400"/>
+                          <a14:foregroundMark x1="15668" y1="70000" x2="13613" y2="81600"/>
+                          <a14:foregroundMark x1="13613" y1="81600" x2="10616" y2="82400"/>
+                          <a14:foregroundMark x1="10616" y1="82400" x2="7962" y2="72800"/>
+                          <a14:foregroundMark x1="7962" y1="72800" x2="10017" y2="62800"/>
+                          <a14:foregroundMark x1="10017" y1="62800" x2="13099" y2="60000"/>
+                          <a14:foregroundMark x1="13099" y1="60000" x2="13955" y2="60800"/>
+                          <a14:foregroundMark x1="8134" y1="65200" x2="6250" y2="76800"/>
+                          <a14:foregroundMark x1="6250" y1="76800" x2="9503" y2="86000"/>
+                          <a14:foregroundMark x1="9503" y1="86000" x2="9503" y2="86000"/>
+                          <a14:foregroundMark x1="14640" y1="24400" x2="12757" y2="26800"/>
+                          <a14:foregroundMark x1="14897" y1="60000" x2="16952" y2="78400"/>
+                          <a14:foregroundMark x1="13955" y1="54000" x2="11045" y2="51600"/>
+                          <a14:foregroundMark x1="11045" y1="51600" x2="6336" y2="62400"/>
+                          <a14:foregroundMark x1="6164" y1="64000" x2="5651" y2="67200"/>
+                          <a14:foregroundMark x1="9247" y1="57600" x2="8476" y2="60000"/>
+                          <a14:foregroundMark x1="11644" y1="51600" x2="13442" y2="52800"/>
+                          <a14:foregroundMark x1="5479" y1="80000" x2="6678" y2="84000"/>
+                          <a14:backgroundMark x1="20719" y1="58000" x2="20462" y2="57200"/>
+                        </a14:backgroundRemoval>
+                      </a14:imgEffect>
+                      <a14:imgEffect>
+                        <a14:sharpenSoften amount="25000"/>
+                      </a14:imgEffect>
+                    </a14:imgLayer>
+                  </a14:imgProps>
+                </a:ext>
+                <a:ext uri="{28A0092B-C50C-407E-A947-70E740481C1C}">
+                  <a14:useLocalDpi xmlns:a14="http://schemas.microsoft.com/office/drawing/2010/main" val="0"/>
+                </a:ext>
+              </a:extLst>
+            </a:blip>
+            <a:srcRect r="77638"/>
+            <a:stretch/>
+          </p:blipFill>
+          <p:spPr>
+            <a:xfrm>
+              <a:off x="242080" y="2217245"/>
+              <a:ext cx="3173434" cy="3037446"/>
+            </a:xfrm>
+            <a:prstGeom prst="rect">
+              <a:avLst/>
+            </a:prstGeom>
+          </p:spPr>
+        </p:pic>
+        <p:sp>
+          <p:nvSpPr>
+            <p:cNvPr id="18" name="Rectangle 17">
+              <a:extLst>
+                <a:ext uri="{FF2B5EF4-FFF2-40B4-BE49-F238E27FC236}">
+                  <a16:creationId xmlns:a16="http://schemas.microsoft.com/office/drawing/2014/main" id="{28AEB293-D3C5-408D-8729-171DEFB0F426}"/>
+                </a:ext>
+              </a:extLst>
+            </p:cNvPr>
+            <p:cNvSpPr/>
+            <p:nvPr/>
+          </p:nvSpPr>
+          <p:spPr>
+            <a:xfrm>
+              <a:off x="601746" y="611233"/>
+              <a:ext cx="1734770" cy="1446550"/>
+            </a:xfrm>
+            <a:prstGeom prst="rect">
+              <a:avLst/>
+            </a:prstGeom>
+          </p:spPr>
+          <p:txBody>
+            <a:bodyPr wrap="none">
+              <a:spAutoFit/>
+            </a:bodyPr>
+            <a:lstStyle/>
+            <a:p>
+              <a:pPr algn="ctr"/>
+              <a:r>
+                <a:rPr lang="en-US" sz="8800" dirty="0">
+                  <a:solidFill>
+                    <a:schemeClr val="bg1"/>
+                  </a:solidFill>
+                  <a:latin typeface="Arial" panose="020B0604020202020204" pitchFamily="34" charset="0"/>
+                  <a:cs typeface="Arial" panose="020B0604020202020204" pitchFamily="34" charset="0"/>
+                </a:rPr>
+                <a:t>🦟</a:t>
+              </a:r>
+            </a:p>
+          </p:txBody>
+        </p:sp>
+        <p:sp>
+          <p:nvSpPr>
+            <p:cNvPr id="21" name="TextBox 20">
+              <a:extLst>
+                <a:ext uri="{FF2B5EF4-FFF2-40B4-BE49-F238E27FC236}">
+                  <a16:creationId xmlns:a16="http://schemas.microsoft.com/office/drawing/2014/main" id="{FAC3651F-C275-4E4A-B06D-FE1CCA4026E1}"/>
+                </a:ext>
+              </a:extLst>
+            </p:cNvPr>
+            <p:cNvSpPr txBox="1"/>
+            <p:nvPr/>
+          </p:nvSpPr>
+          <p:spPr>
+            <a:xfrm>
+              <a:off x="2861862" y="1181423"/>
+              <a:ext cx="4403557" cy="2554545"/>
+            </a:xfrm>
+            <a:prstGeom prst="rect">
+              <a:avLst/>
+            </a:prstGeom>
+            <a:noFill/>
+          </p:spPr>
+          <p:txBody>
+            <a:bodyPr wrap="square" rtlCol="0">
+              <a:spAutoFit/>
+            </a:bodyPr>
+            <a:lstStyle/>
+            <a:p>
+              <a:pPr algn="ctr"/>
+              <a:r>
+                <a:rPr lang="en-US" sz="3200" dirty="0">
+                  <a:solidFill>
+                    <a:schemeClr val="bg1"/>
+                  </a:solidFill>
+                  <a:latin typeface="Arial" panose="020B0604020202020204" pitchFamily="34" charset="0"/>
+                  <a:cs typeface="Arial" panose="020B0604020202020204" pitchFamily="34" charset="0"/>
+                </a:rPr>
+                <a:t>Machine Learning in the Prediction of Artemisinin Resistance and Diagnostic Test Sensitivity in Malaria</a:t>
+              </a:r>
+              <a:endParaRPr lang="en-US" sz="3200" dirty="0">
+                <a:solidFill>
+                  <a:schemeClr val="bg1"/>
+                </a:solidFill>
+              </a:endParaRPr>
+            </a:p>
+          </p:txBody>
+        </p:sp>
+      </p:grpSp>
+    </p:spTree>
+    <p:extLst>
+      <p:ext uri="{BB962C8B-B14F-4D97-AF65-F5344CB8AC3E}">
+        <p14:creationId xmlns:p14="http://schemas.microsoft.com/office/powerpoint/2010/main" val="1884390923"/>
+      </p:ext>
+    </p:extLst>
+  </p:cSld>
+  <p:clrMapOvr>
+    <a:masterClrMapping/>
+  </p:clrMapOvr>
+</p:sld>
+</file>
+
+<file path=ppt/slides/slide3.xml><?xml version="1.0" encoding="utf-8"?>
+<p:sld xmlns:a="http://schemas.openxmlformats.org/drawingml/2006/main" xmlns:r="http://schemas.openxmlformats.org/officeDocument/2006/relationships" xmlns:p="http://schemas.openxmlformats.org/presentationml/2006/main">
+  <p:cSld>
+    <p:spTree>
+      <p:nvGrpSpPr>
+        <p:cNvPr id="1" name=""/>
+        <p:cNvGrpSpPr/>
+        <p:nvPr/>
+      </p:nvGrpSpPr>
+      <p:grpSpPr>
+        <a:xfrm>
+          <a:off x="0" y="0"/>
+          <a:ext cx="0" cy="0"/>
+          <a:chOff x="0" y="0"/>
+          <a:chExt cx="0" cy="0"/>
+        </a:xfrm>
+      </p:grpSpPr>
+      <p:grpSp>
+        <p:nvGrpSpPr>
           <p:cNvPr id="7" name="Group 6">
             <a:extLst>
               <a:ext uri="{FF2B5EF4-FFF2-40B4-BE49-F238E27FC236}">
@@ -6668,7 +7003,7 @@
 </p:sld>
 </file>
 
-<file path=ppt/slides/slide3.xml><?xml version="1.0" encoding="utf-8"?>
+<file path=ppt/slides/slide4.xml><?xml version="1.0" encoding="utf-8"?>
 <p:sld xmlns:a="http://schemas.openxmlformats.org/drawingml/2006/main" xmlns:r="http://schemas.openxmlformats.org/officeDocument/2006/relationships" xmlns:p="http://schemas.openxmlformats.org/presentationml/2006/main">
   <p:cSld>
     <p:spTree>

</xml_diff>